<commit_message>
changed the content to fit await async only without threads
</commit_message>
<xml_diff>
--- a/Events Threads and Async Methods.pptx
+++ b/Events Threads and Async Methods.pptx
@@ -2257,7 +2257,7 @@
                 <a:cs typeface="Tahoma" panose="020B0604030504040204" pitchFamily="34" charset="0"/>
               </a:rPr>
               <a:pPr algn="l" rtl="1"/>
-              <a:t>05 פברואר 22</a:t>
+              <a:t>10 דצמבר 23</a:t>
             </a:fld>
             <a:endParaRPr lang="he-IL" dirty="0">
               <a:latin typeface="Tahoma" panose="020B0604030504040204" pitchFamily="34" charset="0"/>
@@ -2450,7 +2450,7 @@
             <a:fld id="{C544EB51-7437-4ECB-8F53-BD138F55FBF7}" type="datetime8">
               <a:rPr lang="he-IL" smtClean="0"/>
               <a:pPr/>
-              <a:t>05 פברואר 22</a:t>
+              <a:t>10 דצמבר 23</a:t>
             </a:fld>
             <a:endParaRPr lang="he-IL" dirty="0"/>
           </a:p>
@@ -6087,7 +6087,7 @@
             <a:fld id="{2174D080-DCA4-45D3-B2F8-95788556C7F5}" type="datetime8">
               <a:rPr lang="he-IL" smtClean="0"/>
               <a:pPr/>
-              <a:t>05 פברואר 22</a:t>
+              <a:t>10 דצמבר 23</a:t>
             </a:fld>
             <a:endParaRPr lang="he-IL" dirty="0"/>
           </a:p>
@@ -6497,7 +6497,7 @@
             <a:fld id="{B7D9574E-2143-4A91-B2C8-A980D1F6D781}" type="datetime8">
               <a:rPr lang="he-IL" smtClean="0"/>
               <a:pPr/>
-              <a:t>05 פברואר 22</a:t>
+              <a:t>10 דצמבר 23</a:t>
             </a:fld>
             <a:endParaRPr lang="he-IL" dirty="0"/>
           </a:p>
@@ -6702,7 +6702,7 @@
             <a:fld id="{06C4B962-D926-424B-AC00-FE1E0ECB640D}" type="datetime8">
               <a:rPr lang="he-IL" smtClean="0"/>
               <a:pPr/>
-              <a:t>05 פברואר 22</a:t>
+              <a:t>10 דצמבר 23</a:t>
             </a:fld>
             <a:endParaRPr lang="he-IL" dirty="0"/>
           </a:p>
@@ -6906,7 +6906,7 @@
             <a:fld id="{1FA57BC6-D13C-45A2-AF61-CB59F6BA3E10}" type="datetime8">
               <a:rPr lang="he-IL" smtClean="0"/>
               <a:pPr/>
-              <a:t>05 פברואר 22</a:t>
+              <a:t>10 דצמבר 23</a:t>
             </a:fld>
             <a:endParaRPr lang="he-IL" dirty="0"/>
           </a:p>
@@ -7104,7 +7104,7 @@
             <a:fld id="{FE218764-B9AD-4A05-A31E-84CE4FE50E8B}" type="datetime8">
               <a:rPr lang="he-IL" smtClean="0"/>
               <a:pPr/>
-              <a:t>05 פברואר 22</a:t>
+              <a:t>10 דצמבר 23</a:t>
             </a:fld>
             <a:endParaRPr lang="he-IL" dirty="0"/>
           </a:p>
@@ -7520,7 +7520,7 @@
             <a:fld id="{8A31EF28-7E3D-4A0D-8B1D-EAD0E195C731}" type="datetime8">
               <a:rPr lang="he-IL" smtClean="0"/>
               <a:pPr/>
-              <a:t>05 פברואר 22</a:t>
+              <a:t>10 דצמבר 23</a:t>
             </a:fld>
             <a:endParaRPr lang="he-IL" dirty="0"/>
           </a:p>
@@ -7820,7 +7820,7 @@
             <a:fld id="{CA1D98F7-BBB4-4642-B2F6-386FDE1B714A}" type="datetime8">
               <a:rPr lang="he-IL" smtClean="0"/>
               <a:pPr/>
-              <a:t>05 פברואר 22</a:t>
+              <a:t>10 דצמבר 23</a:t>
             </a:fld>
             <a:endParaRPr lang="he-IL" dirty="0"/>
           </a:p>
@@ -8144,7 +8144,7 @@
             <a:fld id="{41072186-3A27-43FD-BA50-C25F08521E08}" type="datetime8">
               <a:rPr lang="he-IL" smtClean="0"/>
               <a:pPr/>
-              <a:t>05 פברואר 22</a:t>
+              <a:t>10 דצמבר 23</a:t>
             </a:fld>
             <a:endParaRPr lang="he-IL" dirty="0"/>
           </a:p>
@@ -8601,7 +8601,7 @@
             <a:fld id="{8AB9AA41-A953-4132-9B44-4E0513AEC4FC}" type="datetime8">
               <a:rPr lang="he-IL" smtClean="0"/>
               <a:pPr/>
-              <a:t>05 פברואר 22</a:t>
+              <a:t>10 דצמבר 23</a:t>
             </a:fld>
             <a:endParaRPr lang="he-IL" dirty="0"/>
           </a:p>
@@ -8739,7 +8739,7 @@
             <a:fld id="{5FF1E4BA-5D86-457F-81D4-527350DD4C7A}" type="datetime8">
               <a:rPr lang="he-IL" smtClean="0"/>
               <a:pPr/>
-              <a:t>05 פברואר 22</a:t>
+              <a:t>10 דצמבר 23</a:t>
             </a:fld>
             <a:endParaRPr lang="he-IL" dirty="0"/>
           </a:p>
@@ -8866,7 +8866,7 @@
             <a:fld id="{2D48FB61-65B6-4A9E-8CC2-7814F08B8B2D}" type="datetime8">
               <a:rPr lang="he-IL" smtClean="0"/>
               <a:pPr algn="l"/>
-              <a:t>05 פברואר 22</a:t>
+              <a:t>10 דצמבר 23</a:t>
             </a:fld>
             <a:endParaRPr lang="he-IL" dirty="0"/>
           </a:p>
@@ -9180,7 +9180,7 @@
             <a:fld id="{221A13E8-9A85-485B-94B7-5D103837E152}" type="datetime8">
               <a:rPr lang="he-IL" smtClean="0"/>
               <a:pPr/>
-              <a:t>05 פברואר 22</a:t>
+              <a:t>10 דצמבר 23</a:t>
             </a:fld>
             <a:endParaRPr lang="he-IL" dirty="0"/>
           </a:p>
@@ -9576,7 +9576,7 @@
             <a:fld id="{E1A69999-6F67-4D06-AF2F-1AEEB328493D}" type="datetime8">
               <a:rPr lang="he-IL" smtClean="0"/>
               <a:pPr/>
-              <a:t>05 פברואר 22</a:t>
+              <a:t>10 דצמבר 23</a:t>
             </a:fld>
             <a:endParaRPr lang="he-IL" dirty="0"/>
           </a:p>
@@ -11915,7 +11915,7 @@
 </file>
 
 <file path=ppt/slides/slide14.xml><?xml version="1.0" encoding="utf-8"?>
-<p:sld xmlns:a="http://schemas.openxmlformats.org/drawingml/2006/main" xmlns:r="http://schemas.openxmlformats.org/officeDocument/2006/relationships" xmlns:p="http://schemas.openxmlformats.org/presentationml/2006/main">
+<p:sld xmlns:a="http://schemas.openxmlformats.org/drawingml/2006/main" xmlns:r="http://schemas.openxmlformats.org/officeDocument/2006/relationships" xmlns:p="http://schemas.openxmlformats.org/presentationml/2006/main" show="0">
   <p:cSld>
     <p:spTree>
       <p:nvGrpSpPr>
@@ -12161,13 +12161,13 @@
   <p:clrMapOvr>
     <a:masterClrMapping/>
   </p:clrMapOvr>
-  <mc:AlternateContent xmlns:mc="http://schemas.openxmlformats.org/markup-compatibility/2006" xmlns:p14="http://schemas.microsoft.com/office/powerpoint/2010/main">
-    <mc:Choice Requires="p14">
+  <mc:AlternateContent xmlns:mc="http://schemas.openxmlformats.org/markup-compatibility/2006">
+    <mc:Choice xmlns:p14="http://schemas.microsoft.com/office/powerpoint/2010/main" Requires="p14">
       <p:transition spd="med" p14:dur="700">
         <p:fade/>
       </p:transition>
     </mc:Choice>
-    <mc:Fallback xmlns="">
+    <mc:Fallback>
       <p:transition spd="med">
         <p:fade/>
       </p:transition>
@@ -12328,7 +12328,7 @@
 </file>
 
 <file path=ppt/slides/slide15.xml><?xml version="1.0" encoding="utf-8"?>
-<p:sld xmlns:a="http://schemas.openxmlformats.org/drawingml/2006/main" xmlns:r="http://schemas.openxmlformats.org/officeDocument/2006/relationships" xmlns:p="http://schemas.openxmlformats.org/presentationml/2006/main">
+<p:sld xmlns:a="http://schemas.openxmlformats.org/drawingml/2006/main" xmlns:r="http://schemas.openxmlformats.org/officeDocument/2006/relationships" xmlns:p="http://schemas.openxmlformats.org/presentationml/2006/main" show="0">
   <p:cSld>
     <p:spTree>
       <p:nvGrpSpPr>
@@ -12480,13 +12480,13 @@
   <p:clrMapOvr>
     <a:masterClrMapping/>
   </p:clrMapOvr>
-  <mc:AlternateContent xmlns:mc="http://schemas.openxmlformats.org/markup-compatibility/2006" xmlns:p14="http://schemas.microsoft.com/office/powerpoint/2010/main">
-    <mc:Choice Requires="p14">
+  <mc:AlternateContent xmlns:mc="http://schemas.openxmlformats.org/markup-compatibility/2006">
+    <mc:Choice xmlns:p14="http://schemas.microsoft.com/office/powerpoint/2010/main" Requires="p14">
       <p:transition spd="med" p14:dur="700">
         <p:fade/>
       </p:transition>
     </mc:Choice>
-    <mc:Fallback xmlns="">
+    <mc:Fallback>
       <p:transition spd="med">
         <p:fade/>
       </p:transition>
@@ -12496,7 +12496,7 @@
 </file>
 
 <file path=ppt/slides/slide16.xml><?xml version="1.0" encoding="utf-8"?>
-<p:sld xmlns:a="http://schemas.openxmlformats.org/drawingml/2006/main" xmlns:r="http://schemas.openxmlformats.org/officeDocument/2006/relationships" xmlns:p="http://schemas.openxmlformats.org/presentationml/2006/main">
+<p:sld xmlns:a="http://schemas.openxmlformats.org/drawingml/2006/main" xmlns:r="http://schemas.openxmlformats.org/officeDocument/2006/relationships" xmlns:p="http://schemas.openxmlformats.org/presentationml/2006/main" show="0">
   <p:cSld>
     <p:spTree>
       <p:nvGrpSpPr>
@@ -12675,13 +12675,13 @@
   <p:clrMapOvr>
     <a:masterClrMapping/>
   </p:clrMapOvr>
-  <mc:AlternateContent xmlns:mc="http://schemas.openxmlformats.org/markup-compatibility/2006" xmlns:p14="http://schemas.microsoft.com/office/powerpoint/2010/main">
-    <mc:Choice Requires="p14">
+  <mc:AlternateContent xmlns:mc="http://schemas.openxmlformats.org/markup-compatibility/2006">
+    <mc:Choice xmlns:p14="http://schemas.microsoft.com/office/powerpoint/2010/main" Requires="p14">
       <p:transition spd="med" p14:dur="700">
         <p:fade/>
       </p:transition>
     </mc:Choice>
-    <mc:Fallback xmlns="">
+    <mc:Fallback>
       <p:transition spd="med">
         <p:fade/>
       </p:transition>
@@ -12691,7 +12691,7 @@
 </file>
 
 <file path=ppt/slides/slide17.xml><?xml version="1.0" encoding="utf-8"?>
-<p:sld xmlns:a="http://schemas.openxmlformats.org/drawingml/2006/main" xmlns:r="http://schemas.openxmlformats.org/officeDocument/2006/relationships" xmlns:p="http://schemas.openxmlformats.org/presentationml/2006/main">
+<p:sld xmlns:a="http://schemas.openxmlformats.org/drawingml/2006/main" xmlns:r="http://schemas.openxmlformats.org/officeDocument/2006/relationships" xmlns:p="http://schemas.openxmlformats.org/presentationml/2006/main" show="0">
   <p:cSld>
     <p:spTree>
       <p:nvGrpSpPr>
@@ -12804,13 +12804,13 @@
   <p:clrMapOvr>
     <a:masterClrMapping/>
   </p:clrMapOvr>
-  <mc:AlternateContent xmlns:mc="http://schemas.openxmlformats.org/markup-compatibility/2006" xmlns:p14="http://schemas.microsoft.com/office/powerpoint/2010/main">
-    <mc:Choice Requires="p14">
+  <mc:AlternateContent xmlns:mc="http://schemas.openxmlformats.org/markup-compatibility/2006">
+    <mc:Choice xmlns:p14="http://schemas.microsoft.com/office/powerpoint/2010/main" Requires="p14">
       <p:transition spd="med" p14:dur="700">
         <p:fade/>
       </p:transition>
     </mc:Choice>
-    <mc:Fallback xmlns="">
+    <mc:Fallback>
       <p:transition spd="med">
         <p:fade/>
       </p:transition>
@@ -13132,13 +13132,13 @@
   <p:clrMapOvr>
     <a:masterClrMapping/>
   </p:clrMapOvr>
-  <mc:AlternateContent xmlns:mc="http://schemas.openxmlformats.org/markup-compatibility/2006">
-    <mc:Choice xmlns:p14="http://schemas.microsoft.com/office/powerpoint/2010/main" Requires="p14">
+  <mc:AlternateContent xmlns:mc="http://schemas.openxmlformats.org/markup-compatibility/2006" xmlns:p14="http://schemas.microsoft.com/office/powerpoint/2010/main">
+    <mc:Choice Requires="p14">
       <p:transition spd="med" p14:dur="700">
         <p:fade/>
       </p:transition>
     </mc:Choice>
-    <mc:Fallback>
+    <mc:Fallback xmlns="">
       <p:transition spd="med">
         <p:fade/>
       </p:transition>
@@ -13148,7 +13148,7 @@
 </file>
 
 <file path=ppt/slides/slide19.xml><?xml version="1.0" encoding="utf-8"?>
-<p:sld xmlns:a="http://schemas.openxmlformats.org/drawingml/2006/main" xmlns:r="http://schemas.openxmlformats.org/officeDocument/2006/relationships" xmlns:p="http://schemas.openxmlformats.org/presentationml/2006/main" show="0">
+<p:sld xmlns:a="http://schemas.openxmlformats.org/drawingml/2006/main" xmlns:r="http://schemas.openxmlformats.org/officeDocument/2006/relationships" xmlns:p="http://schemas.openxmlformats.org/presentationml/2006/main">
   <p:cSld>
     <p:spTree>
       <p:nvGrpSpPr>
@@ -13466,7 +13466,7 @@
 </file>
 
 <file path=ppt/slides/slide20.xml><?xml version="1.0" encoding="utf-8"?>
-<p:sld xmlns:a="http://schemas.openxmlformats.org/drawingml/2006/main" xmlns:r="http://schemas.openxmlformats.org/officeDocument/2006/relationships" xmlns:p="http://schemas.openxmlformats.org/presentationml/2006/main" show="0">
+<p:sld xmlns:a="http://schemas.openxmlformats.org/drawingml/2006/main" xmlns:r="http://schemas.openxmlformats.org/officeDocument/2006/relationships" xmlns:p="http://schemas.openxmlformats.org/presentationml/2006/main">
   <p:cSld>
     <p:spTree>
       <p:nvGrpSpPr>
@@ -13731,7 +13731,7 @@
 </file>
 
 <file path=ppt/slides/slide21.xml><?xml version="1.0" encoding="utf-8"?>
-<p:sld xmlns:a="http://schemas.openxmlformats.org/drawingml/2006/main" xmlns:r="http://schemas.openxmlformats.org/officeDocument/2006/relationships" xmlns:p="http://schemas.openxmlformats.org/presentationml/2006/main" show="0">
+<p:sld xmlns:a="http://schemas.openxmlformats.org/drawingml/2006/main" xmlns:r="http://schemas.openxmlformats.org/officeDocument/2006/relationships" xmlns:p="http://schemas.openxmlformats.org/presentationml/2006/main">
   <p:cSld>
     <p:spTree>
       <p:nvGrpSpPr>
@@ -13917,7 +13917,7 @@
 </file>
 
 <file path=ppt/slides/slide22.xml><?xml version="1.0" encoding="utf-8"?>
-<p:sld xmlns:a="http://schemas.openxmlformats.org/drawingml/2006/main" xmlns:r="http://schemas.openxmlformats.org/officeDocument/2006/relationships" xmlns:p="http://schemas.openxmlformats.org/presentationml/2006/main" show="0">
+<p:sld xmlns:a="http://schemas.openxmlformats.org/drawingml/2006/main" xmlns:r="http://schemas.openxmlformats.org/officeDocument/2006/relationships" xmlns:p="http://schemas.openxmlformats.org/presentationml/2006/main">
   <p:cSld>
     <p:spTree>
       <p:nvGrpSpPr>
@@ -14169,7 +14169,7 @@
 </file>
 
 <file path=ppt/slides/slide23.xml><?xml version="1.0" encoding="utf-8"?>
-<p:sld xmlns:a="http://schemas.openxmlformats.org/drawingml/2006/main" xmlns:r="http://schemas.openxmlformats.org/officeDocument/2006/relationships" xmlns:p="http://schemas.openxmlformats.org/presentationml/2006/main" show="0">
+<p:sld xmlns:a="http://schemas.openxmlformats.org/drawingml/2006/main" xmlns:r="http://schemas.openxmlformats.org/officeDocument/2006/relationships" xmlns:p="http://schemas.openxmlformats.org/presentationml/2006/main">
   <p:cSld>
     <p:spTree>
       <p:nvGrpSpPr>
@@ -14260,7 +14260,7 @@
         <p:spPr>
           <a:xfrm>
             <a:off x="551384" y="764704"/>
-            <a:ext cx="6094602" cy="2462213"/>
+            <a:ext cx="6094602" cy="738664"/>
           </a:xfrm>
           <a:prstGeom prst="rect">
             <a:avLst/>
@@ -14283,157 +14283,7 @@
             </a:br>
             <a:r>
               <a:rPr lang="he-IL" sz="1400" dirty="0"/>
-              <a:t>שנה את התרגיל הקודם כך שבמקום להשתמש ב </a:t>
-            </a:r>
-            <a:r>
-              <a:rPr lang="en-US" sz="1400" dirty="0"/>
-              <a:t>Threads</a:t>
-            </a:r>
-            <a:r>
-              <a:rPr lang="he-IL" sz="1400" dirty="0"/>
-              <a:t> יש להשתמש בפעולות א-סינכרוניות המחזירות </a:t>
-            </a:r>
-            <a:r>
-              <a:rPr lang="en-US" sz="1400" dirty="0"/>
-              <a:t>Task</a:t>
-            </a:r>
-            <a:r>
-              <a:rPr lang="he-IL" sz="1400" dirty="0"/>
-              <a:t> תוך שימוש ב </a:t>
-            </a:r>
-            <a:r>
-              <a:rPr lang="en-US" sz="1400" dirty="0"/>
-              <a:t>await</a:t>
-            </a:r>
-            <a:r>
-              <a:rPr lang="he-IL" sz="1400" dirty="0"/>
-              <a:t> ו </a:t>
-            </a:r>
-            <a:r>
-              <a:rPr lang="en-US" sz="1400" dirty="0"/>
-              <a:t>async</a:t>
-            </a:r>
-            <a:r>
-              <a:rPr lang="he-IL" sz="1400" dirty="0"/>
-              <a:t> כך</a:t>
-            </a:r>
-            <a:r>
-              <a:rPr lang="en-US" sz="1400" dirty="0"/>
-              <a:t>:</a:t>
-            </a:r>
-          </a:p>
-          <a:p>
-            <a:pPr marL="342900" indent="-342900" algn="r">
-              <a:buAutoNum type="arabicPeriod"/>
-            </a:pPr>
-            <a:r>
-              <a:rPr lang="he-IL" sz="1400" dirty="0"/>
-              <a:t>כתוב פעולה חדשה ב </a:t>
-            </a:r>
-            <a:r>
-              <a:rPr lang="en-US" sz="1400" dirty="0"/>
-              <a:t>Electric Car</a:t>
-            </a:r>
-            <a:r>
-              <a:rPr lang="he-IL" sz="1400" dirty="0"/>
-              <a:t> בשם </a:t>
-            </a:r>
-            <a:r>
-              <a:rPr lang="en-US" sz="1400" dirty="0" err="1"/>
-              <a:t>StartEngineAsync</a:t>
-            </a:r>
-            <a:r>
-              <a:rPr lang="he-IL" sz="1400" dirty="0"/>
-              <a:t>. פעולה זו זהה לפעולה </a:t>
-            </a:r>
-            <a:r>
-              <a:rPr lang="en-US" sz="1400" dirty="0" err="1"/>
-              <a:t>StartEngine</a:t>
-            </a:r>
-            <a:r>
-              <a:rPr lang="he-IL" sz="1400" dirty="0"/>
-              <a:t> רק שהיא א-</a:t>
-            </a:r>
-            <a:r>
-              <a:rPr lang="he-IL" sz="1400" dirty="0" err="1"/>
-              <a:t>סנכרונית</a:t>
-            </a:r>
-            <a:r>
-              <a:rPr lang="he-IL" sz="1400" dirty="0"/>
-              <a:t>. במקום להשתמש ב </a:t>
-            </a:r>
-            <a:r>
-              <a:rPr lang="en-US" sz="1400" dirty="0" err="1"/>
-              <a:t>Thread.Sleep</a:t>
-            </a:r>
-            <a:r>
-              <a:rPr lang="he-IL" sz="1400" dirty="0"/>
-              <a:t> יש להשתמש ב </a:t>
-            </a:r>
-            <a:r>
-              <a:rPr lang="en-US" sz="1400" dirty="0" err="1"/>
-              <a:t>Task.Delay</a:t>
-            </a:r>
-            <a:r>
-              <a:rPr lang="he-IL" sz="1400" dirty="0"/>
-              <a:t> עם </a:t>
-            </a:r>
-            <a:r>
-              <a:rPr lang="en-US" sz="1400" dirty="0"/>
-              <a:t>await</a:t>
-            </a:r>
-            <a:r>
-              <a:rPr lang="he-IL" sz="1400" dirty="0"/>
-              <a:t> מתאים.</a:t>
-            </a:r>
-          </a:p>
-          <a:p>
-            <a:pPr marL="342900" indent="-342900" algn="r">
-              <a:buAutoNum type="arabicPeriod"/>
-            </a:pPr>
-            <a:r>
-              <a:rPr lang="he-IL" sz="1400" dirty="0"/>
-              <a:t>כתוב תוכנית שתגדיר מערך של </a:t>
-            </a:r>
-            <a:r>
-              <a:rPr lang="en-US" sz="1400" dirty="0"/>
-              <a:t>Task</a:t>
-            </a:r>
-            <a:r>
-              <a:rPr lang="he-IL" sz="1400" dirty="0"/>
-              <a:t> ומערך של מכוניות חשמליות. התוכנית תשמור בכל תא במערך משימה שנוצרת על ידי הפעלה של </a:t>
-            </a:r>
-            <a:r>
-              <a:rPr lang="en-US" sz="1400" dirty="0" err="1"/>
-              <a:t>StartEningeAsync</a:t>
-            </a:r>
-            <a:r>
-              <a:rPr lang="he-IL" sz="1400" dirty="0"/>
-              <a:t> עבור אובייקטים של </a:t>
-            </a:r>
-            <a:r>
-              <a:rPr lang="en-US" sz="1400" dirty="0"/>
-              <a:t>Electric Car</a:t>
-            </a:r>
-            <a:r>
-              <a:rPr lang="he-IL" sz="1400" dirty="0"/>
-              <a:t>. הפעולה תשתמש ב – </a:t>
-            </a:r>
-            <a:r>
-              <a:rPr lang="en-US" sz="1400" dirty="0" err="1"/>
-              <a:t>Task.WhenAll</a:t>
-            </a:r>
-            <a:r>
-              <a:rPr lang="he-IL" sz="1400" dirty="0"/>
-              <a:t> או ב – </a:t>
-            </a:r>
-            <a:r>
-              <a:rPr lang="en-US" sz="1400" dirty="0" err="1"/>
-              <a:t>Task.WhenAny</a:t>
-            </a:r>
-            <a:r>
-              <a:rPr lang="he-IL" sz="1400" dirty="0"/>
-              <a:t> על מנת לסיים את התוכנית רק כאשר כל המכוניות כבו.</a:t>
+              <a:t>דף מצורף</a:t>
             </a:r>
             <a:endParaRPr lang="en-US" sz="1400" dirty="0"/>
           </a:p>
@@ -14465,7 +14315,7 @@
 </file>
 
 <file path=ppt/slides/slide24.xml><?xml version="1.0" encoding="utf-8"?>
-<p:sld xmlns:a="http://schemas.openxmlformats.org/drawingml/2006/main" xmlns:r="http://schemas.openxmlformats.org/officeDocument/2006/relationships" xmlns:p="http://schemas.openxmlformats.org/presentationml/2006/main" show="0">
+<p:sld xmlns:a="http://schemas.openxmlformats.org/drawingml/2006/main" xmlns:r="http://schemas.openxmlformats.org/officeDocument/2006/relationships" xmlns:p="http://schemas.openxmlformats.org/presentationml/2006/main">
   <p:cSld>
     <p:spTree>
       <p:nvGrpSpPr>
@@ -14597,7 +14447,7 @@
 </file>
 
 <file path=ppt/slides/slide25.xml><?xml version="1.0" encoding="utf-8"?>
-<p:sld xmlns:a="http://schemas.openxmlformats.org/drawingml/2006/main" xmlns:r="http://schemas.openxmlformats.org/officeDocument/2006/relationships" xmlns:p="http://schemas.openxmlformats.org/presentationml/2006/main" show="0">
+<p:sld xmlns:a="http://schemas.openxmlformats.org/drawingml/2006/main" xmlns:r="http://schemas.openxmlformats.org/officeDocument/2006/relationships" xmlns:p="http://schemas.openxmlformats.org/presentationml/2006/main">
   <p:cSld>
     <p:spTree>
       <p:nvGrpSpPr>
@@ -15007,13 +14857,13 @@
   <p:clrMapOvr>
     <a:masterClrMapping/>
   </p:clrMapOvr>
-  <mc:AlternateContent xmlns:mc="http://schemas.openxmlformats.org/markup-compatibility/2006">
-    <mc:Choice xmlns:p14="http://schemas.microsoft.com/office/powerpoint/2010/main" Requires="p14">
+  <mc:AlternateContent xmlns:mc="http://schemas.openxmlformats.org/markup-compatibility/2006" xmlns:p14="http://schemas.microsoft.com/office/powerpoint/2010/main">
+    <mc:Choice Requires="p14">
       <p:transition spd="med" p14:dur="700">
         <p:fade/>
       </p:transition>
     </mc:Choice>
-    <mc:Fallback>
+    <mc:Fallback xmlns="">
       <p:transition spd="med">
         <p:fade/>
       </p:transition>
@@ -15158,10 +15008,10 @@
       </p:sp>
       <p:pic>
         <p:nvPicPr>
-          <p:cNvPr id="5" name="תמונה 4">
+          <p:cNvPr id="4" name="Picture 3">
             <a:extLst>
               <a:ext uri="{FF2B5EF4-FFF2-40B4-BE49-F238E27FC236}">
-                <a16:creationId xmlns:a16="http://schemas.microsoft.com/office/drawing/2014/main" id="{9ED7ADA3-CC6E-42B0-8AF4-2829B938B0B4}"/>
+                <a16:creationId xmlns:a16="http://schemas.microsoft.com/office/drawing/2014/main" id="{902AB538-66CA-C524-D25D-182339610B8D}"/>
               </a:ext>
             </a:extLst>
           </p:cNvPr>
@@ -15178,8 +15028,8 @@
         </p:blipFill>
         <p:spPr>
           <a:xfrm>
-            <a:off x="335360" y="285311"/>
-            <a:ext cx="6535062" cy="6287377"/>
+            <a:off x="47328" y="476672"/>
+            <a:ext cx="7169518" cy="6115364"/>
           </a:xfrm>
           <a:prstGeom prst="rect">
             <a:avLst/>
@@ -15196,13 +15046,13 @@
   <p:clrMapOvr>
     <a:masterClrMapping/>
   </p:clrMapOvr>
-  <mc:AlternateContent xmlns:mc="http://schemas.openxmlformats.org/markup-compatibility/2006">
-    <mc:Choice xmlns:p14="http://schemas.microsoft.com/office/powerpoint/2010/main" Requires="p14">
+  <mc:AlternateContent xmlns:mc="http://schemas.openxmlformats.org/markup-compatibility/2006" xmlns:p14="http://schemas.microsoft.com/office/powerpoint/2010/main">
+    <mc:Choice Requires="p14">
       <p:transition spd="med" p14:dur="700">
         <p:fade/>
       </p:transition>
     </mc:Choice>
-    <mc:Fallback>
+    <mc:Fallback xmlns="">
       <p:transition spd="med">
         <p:fade/>
       </p:transition>
@@ -15408,13 +15258,13 @@
   <p:clrMapOvr>
     <a:masterClrMapping/>
   </p:clrMapOvr>
-  <mc:AlternateContent xmlns:mc="http://schemas.openxmlformats.org/markup-compatibility/2006">
-    <mc:Choice xmlns:p14="http://schemas.microsoft.com/office/powerpoint/2010/main" Requires="p14">
+  <mc:AlternateContent xmlns:mc="http://schemas.openxmlformats.org/markup-compatibility/2006" xmlns:p14="http://schemas.microsoft.com/office/powerpoint/2010/main">
+    <mc:Choice Requires="p14">
       <p:transition spd="med" p14:dur="700">
         <p:fade/>
       </p:transition>
     </mc:Choice>
-    <mc:Fallback>
+    <mc:Fallback xmlns="">
       <p:transition spd="med">
         <p:fade/>
       </p:transition>
@@ -15605,13 +15455,13 @@
   <p:clrMapOvr>
     <a:masterClrMapping/>
   </p:clrMapOvr>
-  <mc:AlternateContent xmlns:mc="http://schemas.openxmlformats.org/markup-compatibility/2006">
-    <mc:Choice xmlns:p14="http://schemas.microsoft.com/office/powerpoint/2010/main" Requires="p14">
+  <mc:AlternateContent xmlns:mc="http://schemas.openxmlformats.org/markup-compatibility/2006" xmlns:p14="http://schemas.microsoft.com/office/powerpoint/2010/main">
+    <mc:Choice Requires="p14">
       <p:transition spd="med" p14:dur="700">
         <p:fade/>
       </p:transition>
     </mc:Choice>
-    <mc:Fallback>
+    <mc:Fallback xmlns="">
       <p:transition spd="med">
         <p:fade/>
       </p:transition>
@@ -16186,13 +16036,13 @@
   <p:clrMapOvr>
     <a:masterClrMapping/>
   </p:clrMapOvr>
-  <mc:AlternateContent xmlns:mc="http://schemas.openxmlformats.org/markup-compatibility/2006">
-    <mc:Choice xmlns:p14="http://schemas.microsoft.com/office/powerpoint/2010/main" Requires="p14">
+  <mc:AlternateContent xmlns:mc="http://schemas.openxmlformats.org/markup-compatibility/2006" xmlns:p14="http://schemas.microsoft.com/office/powerpoint/2010/main">
+    <mc:Choice Requires="p14">
       <p:transition spd="med" p14:dur="700">
         <p:fade/>
       </p:transition>
     </mc:Choice>
-    <mc:Fallback>
+    <mc:Fallback xmlns="">
       <p:transition spd="med">
         <p:fade/>
       </p:transition>
@@ -16352,10 +16202,10 @@
       </p:sp>
       <p:pic>
         <p:nvPicPr>
-          <p:cNvPr id="4" name="תמונה 3">
+          <p:cNvPr id="5" name="Picture 4">
             <a:extLst>
               <a:ext uri="{FF2B5EF4-FFF2-40B4-BE49-F238E27FC236}">
-                <a16:creationId xmlns:a16="http://schemas.microsoft.com/office/drawing/2014/main" id="{CCF27F9B-4D69-4136-8EB7-33F93BEC2294}"/>
+                <a16:creationId xmlns:a16="http://schemas.microsoft.com/office/drawing/2014/main" id="{37208796-07DC-2BBC-4D76-6D8CCF9833D9}"/>
               </a:ext>
             </a:extLst>
           </p:cNvPr>
@@ -16372,8 +16222,8 @@
         </p:blipFill>
         <p:spPr>
           <a:xfrm>
-            <a:off x="824278" y="27384"/>
-            <a:ext cx="5284033" cy="6858000"/>
+            <a:off x="263352" y="0"/>
+            <a:ext cx="5645603" cy="6858000"/>
           </a:xfrm>
           <a:prstGeom prst="rect">
             <a:avLst/>
@@ -16390,13 +16240,13 @@
   <p:clrMapOvr>
     <a:masterClrMapping/>
   </p:clrMapOvr>
-  <mc:AlternateContent xmlns:mc="http://schemas.openxmlformats.org/markup-compatibility/2006">
-    <mc:Choice xmlns:p14="http://schemas.microsoft.com/office/powerpoint/2010/main" Requires="p14">
+  <mc:AlternateContent xmlns:mc="http://schemas.openxmlformats.org/markup-compatibility/2006" xmlns:p14="http://schemas.microsoft.com/office/powerpoint/2010/main">
+    <mc:Choice Requires="p14">
       <p:transition spd="med" p14:dur="700">
         <p:fade/>
       </p:transition>
     </mc:Choice>
-    <mc:Fallback>
+    <mc:Fallback xmlns="">
       <p:transition spd="med">
         <p:fade/>
       </p:transition>
@@ -17123,8 +16973,8 @@
         </p:nvSpPr>
         <p:spPr>
           <a:xfrm>
-            <a:off x="254137" y="257155"/>
-            <a:ext cx="6094602" cy="6340197"/>
+            <a:off x="254136" y="257155"/>
+            <a:ext cx="6489935" cy="6186309"/>
           </a:xfrm>
           <a:prstGeom prst="rect">
             <a:avLst/>
@@ -17139,365 +16989,1438 @@
           <a:p>
             <a:pPr algn="l" rtl="0"/>
             <a:r>
-              <a:rPr lang="en-US" sz="1400" dirty="0"/>
-              <a:t> class </a:t>
-            </a:r>
-            <a:r>
-              <a:rPr lang="en-US" sz="1400" dirty="0" err="1"/>
+              <a:rPr lang="en-US" sz="1050" dirty="0"/>
+              <a:t> </a:t>
+            </a:r>
+            <a:r>
+              <a:rPr lang="en-US" sz="1200" dirty="0">
+                <a:solidFill>
+                  <a:srgbClr val="000000"/>
+                </a:solidFill>
+                <a:latin typeface="Cascadia Mono" panose="020B0609020000020004" pitchFamily="49" charset="0"/>
+              </a:rPr>
+              <a:t>    </a:t>
+            </a:r>
+            <a:r>
+              <a:rPr lang="en-US" sz="1200" dirty="0">
+                <a:solidFill>
+                  <a:srgbClr val="0000FF"/>
+                </a:solidFill>
+                <a:latin typeface="Cascadia Mono" panose="020B0609020000020004" pitchFamily="49" charset="0"/>
+              </a:rPr>
+              <a:t>class</a:t>
+            </a:r>
+            <a:r>
+              <a:rPr lang="en-US" sz="1200" dirty="0">
+                <a:solidFill>
+                  <a:srgbClr val="000000"/>
+                </a:solidFill>
+                <a:latin typeface="Cascadia Mono" panose="020B0609020000020004" pitchFamily="49" charset="0"/>
+              </a:rPr>
+              <a:t> </a:t>
+            </a:r>
+            <a:r>
+              <a:rPr lang="en-US" sz="1200" dirty="0" err="1">
+                <a:solidFill>
+                  <a:srgbClr val="2B91AF"/>
+                </a:solidFill>
+                <a:latin typeface="Cascadia Mono" panose="020B0609020000020004" pitchFamily="49" charset="0"/>
+              </a:rPr>
               <a:t>TaskExecutor</a:t>
             </a:r>
-            <a:endParaRPr lang="en-US" sz="1400" dirty="0"/>
+            <a:endParaRPr lang="en-US" sz="1200" dirty="0">
+              <a:solidFill>
+                <a:srgbClr val="000000"/>
+              </a:solidFill>
+              <a:latin typeface="Cascadia Mono" panose="020B0609020000020004" pitchFamily="49" charset="0"/>
+            </a:endParaRPr>
           </a:p>
           <a:p>
             <a:pPr algn="l" rtl="0"/>
             <a:r>
-              <a:rPr lang="en-US" sz="1400" dirty="0"/>
+              <a:rPr lang="en-IL" sz="1200" dirty="0">
+                <a:solidFill>
+                  <a:srgbClr val="000000"/>
+                </a:solidFill>
+                <a:latin typeface="Cascadia Mono" panose="020B0609020000020004" pitchFamily="49" charset="0"/>
+              </a:rPr>
               <a:t>    {</a:t>
             </a:r>
           </a:p>
           <a:p>
             <a:pPr algn="l" rtl="0"/>
             <a:r>
-              <a:rPr lang="en-US" sz="1400" dirty="0"/>
-              <a:t>        private string name;</a:t>
+              <a:rPr lang="en-US" sz="1200" dirty="0">
+                <a:solidFill>
+                  <a:srgbClr val="000000"/>
+                </a:solidFill>
+                <a:latin typeface="Cascadia Mono" panose="020B0609020000020004" pitchFamily="49" charset="0"/>
+              </a:rPr>
+              <a:t>        </a:t>
+            </a:r>
+            <a:r>
+              <a:rPr lang="en-US" sz="1200" dirty="0">
+                <a:solidFill>
+                  <a:srgbClr val="0000FF"/>
+                </a:solidFill>
+                <a:latin typeface="Cascadia Mono" panose="020B0609020000020004" pitchFamily="49" charset="0"/>
+              </a:rPr>
+              <a:t>private</a:t>
+            </a:r>
+            <a:r>
+              <a:rPr lang="en-US" sz="1200" dirty="0">
+                <a:solidFill>
+                  <a:srgbClr val="000000"/>
+                </a:solidFill>
+                <a:latin typeface="Cascadia Mono" panose="020B0609020000020004" pitchFamily="49" charset="0"/>
+              </a:rPr>
+              <a:t> </a:t>
+            </a:r>
+            <a:r>
+              <a:rPr lang="en-US" sz="1200" dirty="0">
+                <a:solidFill>
+                  <a:srgbClr val="0000FF"/>
+                </a:solidFill>
+                <a:latin typeface="Cascadia Mono" panose="020B0609020000020004" pitchFamily="49" charset="0"/>
+              </a:rPr>
+              <a:t>string</a:t>
+            </a:r>
+            <a:r>
+              <a:rPr lang="en-US" sz="1200" dirty="0">
+                <a:solidFill>
+                  <a:srgbClr val="000000"/>
+                </a:solidFill>
+                <a:latin typeface="Cascadia Mono" panose="020B0609020000020004" pitchFamily="49" charset="0"/>
+              </a:rPr>
+              <a:t> name;</a:t>
             </a:r>
           </a:p>
           <a:p>
             <a:pPr algn="l" rtl="0"/>
             <a:r>
-              <a:rPr lang="en-US" sz="1400" dirty="0"/>
-              <a:t>        private int </a:t>
-            </a:r>
-            <a:r>
-              <a:rPr lang="en-US" sz="1400" dirty="0" err="1"/>
+              <a:rPr lang="en-US" sz="1200" dirty="0">
+                <a:solidFill>
+                  <a:srgbClr val="000000"/>
+                </a:solidFill>
+                <a:latin typeface="Cascadia Mono" panose="020B0609020000020004" pitchFamily="49" charset="0"/>
+              </a:rPr>
+              <a:t>        </a:t>
+            </a:r>
+            <a:r>
+              <a:rPr lang="en-US" sz="1200" dirty="0">
+                <a:solidFill>
+                  <a:srgbClr val="0000FF"/>
+                </a:solidFill>
+                <a:latin typeface="Cascadia Mono" panose="020B0609020000020004" pitchFamily="49" charset="0"/>
+              </a:rPr>
+              <a:t>private</a:t>
+            </a:r>
+            <a:r>
+              <a:rPr lang="en-US" sz="1200" dirty="0">
+                <a:solidFill>
+                  <a:srgbClr val="000000"/>
+                </a:solidFill>
+                <a:latin typeface="Cascadia Mono" panose="020B0609020000020004" pitchFamily="49" charset="0"/>
+              </a:rPr>
+              <a:t> </a:t>
+            </a:r>
+            <a:r>
+              <a:rPr lang="en-US" sz="1200" dirty="0">
+                <a:solidFill>
+                  <a:srgbClr val="0000FF"/>
+                </a:solidFill>
+                <a:latin typeface="Cascadia Mono" panose="020B0609020000020004" pitchFamily="49" charset="0"/>
+              </a:rPr>
+              <a:t>int</a:t>
+            </a:r>
+            <a:r>
+              <a:rPr lang="en-US" sz="1200" dirty="0">
+                <a:solidFill>
+                  <a:srgbClr val="000000"/>
+                </a:solidFill>
+                <a:latin typeface="Cascadia Mono" panose="020B0609020000020004" pitchFamily="49" charset="0"/>
+              </a:rPr>
+              <a:t> </a:t>
+            </a:r>
+            <a:r>
+              <a:rPr lang="en-US" sz="1200" dirty="0" err="1">
+                <a:solidFill>
+                  <a:srgbClr val="000000"/>
+                </a:solidFill>
+                <a:latin typeface="Cascadia Mono" panose="020B0609020000020004" pitchFamily="49" charset="0"/>
+              </a:rPr>
               <a:t>timeInMiliSec</a:t>
             </a:r>
             <a:r>
-              <a:rPr lang="en-US" sz="1400" dirty="0"/>
+              <a:rPr lang="en-US" sz="1200" dirty="0">
+                <a:solidFill>
+                  <a:srgbClr val="000000"/>
+                </a:solidFill>
+                <a:latin typeface="Cascadia Mono" panose="020B0609020000020004" pitchFamily="49" charset="0"/>
+              </a:rPr>
               <a:t>;</a:t>
             </a:r>
           </a:p>
           <a:p>
             <a:pPr algn="l" rtl="0"/>
             <a:r>
-              <a:rPr lang="en-US" sz="1400" dirty="0"/>
-              <a:t>        public </a:t>
-            </a:r>
-            <a:r>
-              <a:rPr lang="en-US" sz="1400" dirty="0" err="1"/>
+              <a:rPr lang="en-US" sz="1200" dirty="0">
+                <a:solidFill>
+                  <a:srgbClr val="000000"/>
+                </a:solidFill>
+                <a:latin typeface="Cascadia Mono" panose="020B0609020000020004" pitchFamily="49" charset="0"/>
+              </a:rPr>
+              <a:t>        </a:t>
+            </a:r>
+            <a:r>
+              <a:rPr lang="en-US" sz="1200" dirty="0">
+                <a:solidFill>
+                  <a:srgbClr val="0000FF"/>
+                </a:solidFill>
+                <a:latin typeface="Cascadia Mono" panose="020B0609020000020004" pitchFamily="49" charset="0"/>
+              </a:rPr>
+              <a:t>public</a:t>
+            </a:r>
+            <a:r>
+              <a:rPr lang="en-US" sz="1200" dirty="0">
+                <a:solidFill>
+                  <a:srgbClr val="000000"/>
+                </a:solidFill>
+                <a:latin typeface="Cascadia Mono" panose="020B0609020000020004" pitchFamily="49" charset="0"/>
+              </a:rPr>
+              <a:t> </a:t>
+            </a:r>
+            <a:r>
+              <a:rPr lang="en-US" sz="1200" dirty="0" err="1">
+                <a:solidFill>
+                  <a:srgbClr val="2B91AF"/>
+                </a:solidFill>
+                <a:latin typeface="Cascadia Mono" panose="020B0609020000020004" pitchFamily="49" charset="0"/>
+              </a:rPr>
               <a:t>TaskExecutor</a:t>
             </a:r>
             <a:r>
-              <a:rPr lang="en-US" sz="1400" dirty="0"/>
-              <a:t>(string name, int </a:t>
-            </a:r>
-            <a:r>
-              <a:rPr lang="en-US" sz="1400" dirty="0" err="1"/>
+              <a:rPr lang="en-US" sz="1200" dirty="0">
+                <a:solidFill>
+                  <a:srgbClr val="000000"/>
+                </a:solidFill>
+                <a:latin typeface="Cascadia Mono" panose="020B0609020000020004" pitchFamily="49" charset="0"/>
+              </a:rPr>
+              <a:t>(</a:t>
+            </a:r>
+            <a:r>
+              <a:rPr lang="en-US" sz="1200" dirty="0">
+                <a:solidFill>
+                  <a:srgbClr val="0000FF"/>
+                </a:solidFill>
+                <a:latin typeface="Cascadia Mono" panose="020B0609020000020004" pitchFamily="49" charset="0"/>
+              </a:rPr>
+              <a:t>string</a:t>
+            </a:r>
+            <a:r>
+              <a:rPr lang="en-US" sz="1200" dirty="0">
+                <a:solidFill>
+                  <a:srgbClr val="000000"/>
+                </a:solidFill>
+                <a:latin typeface="Cascadia Mono" panose="020B0609020000020004" pitchFamily="49" charset="0"/>
+              </a:rPr>
+              <a:t> name, </a:t>
+            </a:r>
+            <a:r>
+              <a:rPr lang="en-US" sz="1200" dirty="0">
+                <a:solidFill>
+                  <a:srgbClr val="0000FF"/>
+                </a:solidFill>
+                <a:latin typeface="Cascadia Mono" panose="020B0609020000020004" pitchFamily="49" charset="0"/>
+              </a:rPr>
+              <a:t>int</a:t>
+            </a:r>
+            <a:r>
+              <a:rPr lang="en-US" sz="1200" dirty="0">
+                <a:solidFill>
+                  <a:srgbClr val="000000"/>
+                </a:solidFill>
+                <a:latin typeface="Cascadia Mono" panose="020B0609020000020004" pitchFamily="49" charset="0"/>
+              </a:rPr>
+              <a:t> </a:t>
+            </a:r>
+            <a:r>
+              <a:rPr lang="en-US" sz="1200" dirty="0" err="1">
+                <a:solidFill>
+                  <a:srgbClr val="000000"/>
+                </a:solidFill>
+                <a:latin typeface="Cascadia Mono" panose="020B0609020000020004" pitchFamily="49" charset="0"/>
+              </a:rPr>
               <a:t>ms</a:t>
             </a:r>
             <a:r>
-              <a:rPr lang="en-US" sz="1400" dirty="0"/>
+              <a:rPr lang="en-US" sz="1200" dirty="0">
+                <a:solidFill>
+                  <a:srgbClr val="000000"/>
+                </a:solidFill>
+                <a:latin typeface="Cascadia Mono" panose="020B0609020000020004" pitchFamily="49" charset="0"/>
+              </a:rPr>
               <a:t>)</a:t>
             </a:r>
           </a:p>
           <a:p>
             <a:pPr algn="l" rtl="0"/>
             <a:r>
-              <a:rPr lang="en-US" sz="1400" dirty="0"/>
+              <a:rPr lang="en-IL" sz="1200" dirty="0">
+                <a:solidFill>
+                  <a:srgbClr val="000000"/>
+                </a:solidFill>
+                <a:latin typeface="Cascadia Mono" panose="020B0609020000020004" pitchFamily="49" charset="0"/>
+              </a:rPr>
               <a:t>        {</a:t>
             </a:r>
           </a:p>
           <a:p>
             <a:pPr algn="l" rtl="0"/>
             <a:r>
-              <a:rPr lang="en-US" sz="1400" dirty="0"/>
+              <a:rPr lang="en-US" sz="1200" dirty="0">
+                <a:solidFill>
+                  <a:srgbClr val="000000"/>
+                </a:solidFill>
+                <a:latin typeface="Cascadia Mono" panose="020B0609020000020004" pitchFamily="49" charset="0"/>
+              </a:rPr>
               <a:t>            </a:t>
             </a:r>
             <a:r>
-              <a:rPr lang="en-US" sz="1400" dirty="0" err="1"/>
-              <a:t>this.timeInMiliSec</a:t>
-            </a:r>
-            <a:r>
-              <a:rPr lang="en-US" sz="1400" dirty="0"/>
+              <a:rPr lang="en-US" sz="1200" dirty="0" err="1">
+                <a:solidFill>
+                  <a:srgbClr val="0000FF"/>
+                </a:solidFill>
+                <a:latin typeface="Cascadia Mono" panose="020B0609020000020004" pitchFamily="49" charset="0"/>
+              </a:rPr>
+              <a:t>this</a:t>
+            </a:r>
+            <a:r>
+              <a:rPr lang="en-US" sz="1200" dirty="0" err="1">
+                <a:solidFill>
+                  <a:srgbClr val="000000"/>
+                </a:solidFill>
+                <a:latin typeface="Cascadia Mono" panose="020B0609020000020004" pitchFamily="49" charset="0"/>
+              </a:rPr>
+              <a:t>.timeInMiliSec</a:t>
+            </a:r>
+            <a:r>
+              <a:rPr lang="en-US" sz="1200" dirty="0">
+                <a:solidFill>
+                  <a:srgbClr val="000000"/>
+                </a:solidFill>
+                <a:latin typeface="Cascadia Mono" panose="020B0609020000020004" pitchFamily="49" charset="0"/>
+              </a:rPr>
               <a:t> = </a:t>
             </a:r>
             <a:r>
-              <a:rPr lang="en-US" sz="1400" dirty="0" err="1"/>
+              <a:rPr lang="en-US" sz="1200" dirty="0" err="1">
+                <a:solidFill>
+                  <a:srgbClr val="000000"/>
+                </a:solidFill>
+                <a:latin typeface="Cascadia Mono" panose="020B0609020000020004" pitchFamily="49" charset="0"/>
+              </a:rPr>
               <a:t>ms</a:t>
             </a:r>
             <a:r>
-              <a:rPr lang="en-US" sz="1400" dirty="0"/>
+              <a:rPr lang="en-US" sz="1200" dirty="0">
+                <a:solidFill>
+                  <a:srgbClr val="000000"/>
+                </a:solidFill>
+                <a:latin typeface="Cascadia Mono" panose="020B0609020000020004" pitchFamily="49" charset="0"/>
+              </a:rPr>
               <a:t>;</a:t>
             </a:r>
           </a:p>
           <a:p>
             <a:pPr algn="l" rtl="0"/>
             <a:r>
-              <a:rPr lang="en-US" sz="1400" dirty="0"/>
-              <a:t>            this.name = name;</a:t>
+              <a:rPr lang="en-US" sz="1200" dirty="0">
+                <a:solidFill>
+                  <a:srgbClr val="000000"/>
+                </a:solidFill>
+                <a:latin typeface="Cascadia Mono" panose="020B0609020000020004" pitchFamily="49" charset="0"/>
+              </a:rPr>
+              <a:t>            </a:t>
+            </a:r>
+            <a:r>
+              <a:rPr lang="en-US" sz="1200" dirty="0">
+                <a:solidFill>
+                  <a:srgbClr val="0000FF"/>
+                </a:solidFill>
+                <a:latin typeface="Cascadia Mono" panose="020B0609020000020004" pitchFamily="49" charset="0"/>
+              </a:rPr>
+              <a:t>this</a:t>
+            </a:r>
+            <a:r>
+              <a:rPr lang="en-US" sz="1200" dirty="0">
+                <a:solidFill>
+                  <a:srgbClr val="000000"/>
+                </a:solidFill>
+                <a:latin typeface="Cascadia Mono" panose="020B0609020000020004" pitchFamily="49" charset="0"/>
+              </a:rPr>
+              <a:t>.name = name;</a:t>
             </a:r>
           </a:p>
           <a:p>
             <a:pPr algn="l" rtl="0"/>
             <a:r>
-              <a:rPr lang="en-US" sz="1400" dirty="0"/>
+              <a:rPr lang="en-IL" sz="1200" dirty="0">
+                <a:solidFill>
+                  <a:srgbClr val="000000"/>
+                </a:solidFill>
+                <a:latin typeface="Cascadia Mono" panose="020B0609020000020004" pitchFamily="49" charset="0"/>
+              </a:rPr>
               <a:t>        }</a:t>
             </a:r>
           </a:p>
           <a:p>
             <a:pPr algn="l" rtl="0"/>
-            <a:endParaRPr lang="en-US" sz="1400" dirty="0"/>
+            <a:endParaRPr lang="en-IL" sz="1200" dirty="0">
+              <a:solidFill>
+                <a:srgbClr val="000000"/>
+              </a:solidFill>
+              <a:latin typeface="Cascadia Mono" panose="020B0609020000020004" pitchFamily="49" charset="0"/>
+            </a:endParaRPr>
           </a:p>
           <a:p>
             <a:pPr algn="l" rtl="0"/>
             <a:r>
-              <a:rPr lang="en-US" sz="1400" dirty="0"/>
-              <a:t>        public string Name { get { return this.name;  } }</a:t>
+              <a:rPr lang="en-US" sz="1200" dirty="0">
+                <a:solidFill>
+                  <a:srgbClr val="000000"/>
+                </a:solidFill>
+                <a:latin typeface="Cascadia Mono" panose="020B0609020000020004" pitchFamily="49" charset="0"/>
+              </a:rPr>
+              <a:t>        </a:t>
+            </a:r>
+            <a:r>
+              <a:rPr lang="en-US" sz="1200" dirty="0">
+                <a:solidFill>
+                  <a:srgbClr val="0000FF"/>
+                </a:solidFill>
+                <a:latin typeface="Cascadia Mono" panose="020B0609020000020004" pitchFamily="49" charset="0"/>
+              </a:rPr>
+              <a:t>public</a:t>
+            </a:r>
+            <a:r>
+              <a:rPr lang="en-US" sz="1200" dirty="0">
+                <a:solidFill>
+                  <a:srgbClr val="000000"/>
+                </a:solidFill>
+                <a:latin typeface="Cascadia Mono" panose="020B0609020000020004" pitchFamily="49" charset="0"/>
+              </a:rPr>
+              <a:t> </a:t>
+            </a:r>
+            <a:r>
+              <a:rPr lang="en-US" sz="1200" dirty="0">
+                <a:solidFill>
+                  <a:srgbClr val="0000FF"/>
+                </a:solidFill>
+                <a:latin typeface="Cascadia Mono" panose="020B0609020000020004" pitchFamily="49" charset="0"/>
+              </a:rPr>
+              <a:t>string</a:t>
+            </a:r>
+            <a:r>
+              <a:rPr lang="en-US" sz="1200" dirty="0">
+                <a:solidFill>
+                  <a:srgbClr val="000000"/>
+                </a:solidFill>
+                <a:latin typeface="Cascadia Mono" panose="020B0609020000020004" pitchFamily="49" charset="0"/>
+              </a:rPr>
+              <a:t> Name { </a:t>
+            </a:r>
+            <a:r>
+              <a:rPr lang="en-US" sz="1200" dirty="0">
+                <a:solidFill>
+                  <a:srgbClr val="0000FF"/>
+                </a:solidFill>
+                <a:latin typeface="Cascadia Mono" panose="020B0609020000020004" pitchFamily="49" charset="0"/>
+              </a:rPr>
+              <a:t>get</a:t>
+            </a:r>
+            <a:r>
+              <a:rPr lang="en-US" sz="1200" dirty="0">
+                <a:solidFill>
+                  <a:srgbClr val="000000"/>
+                </a:solidFill>
+                <a:latin typeface="Cascadia Mono" panose="020B0609020000020004" pitchFamily="49" charset="0"/>
+              </a:rPr>
+              <a:t> { </a:t>
+            </a:r>
+            <a:r>
+              <a:rPr lang="en-US" sz="1200" dirty="0">
+                <a:solidFill>
+                  <a:srgbClr val="0000FF"/>
+                </a:solidFill>
+                <a:latin typeface="Cascadia Mono" panose="020B0609020000020004" pitchFamily="49" charset="0"/>
+              </a:rPr>
+              <a:t>return</a:t>
+            </a:r>
+            <a:r>
+              <a:rPr lang="en-US" sz="1200" dirty="0">
+                <a:solidFill>
+                  <a:srgbClr val="000000"/>
+                </a:solidFill>
+                <a:latin typeface="Cascadia Mono" panose="020B0609020000020004" pitchFamily="49" charset="0"/>
+              </a:rPr>
+              <a:t> </a:t>
+            </a:r>
+            <a:r>
+              <a:rPr lang="en-US" sz="1200" dirty="0">
+                <a:solidFill>
+                  <a:srgbClr val="0000FF"/>
+                </a:solidFill>
+                <a:latin typeface="Cascadia Mono" panose="020B0609020000020004" pitchFamily="49" charset="0"/>
+              </a:rPr>
+              <a:t>this</a:t>
+            </a:r>
+            <a:r>
+              <a:rPr lang="en-US" sz="1200" dirty="0">
+                <a:solidFill>
+                  <a:srgbClr val="000000"/>
+                </a:solidFill>
+                <a:latin typeface="Cascadia Mono" panose="020B0609020000020004" pitchFamily="49" charset="0"/>
+              </a:rPr>
+              <a:t>.name; } }</a:t>
             </a:r>
           </a:p>
           <a:p>
             <a:pPr algn="l" rtl="0"/>
             <a:r>
-              <a:rPr lang="en-US" sz="1400" dirty="0"/>
-              <a:t>        public void Start()</a:t>
+              <a:rPr lang="en-US" sz="1200" dirty="0">
+                <a:solidFill>
+                  <a:srgbClr val="000000"/>
+                </a:solidFill>
+                <a:latin typeface="Cascadia Mono" panose="020B0609020000020004" pitchFamily="49" charset="0"/>
+              </a:rPr>
+              <a:t>        </a:t>
+            </a:r>
+            <a:r>
+              <a:rPr lang="en-US" sz="1200" dirty="0">
+                <a:solidFill>
+                  <a:srgbClr val="0000FF"/>
+                </a:solidFill>
+                <a:latin typeface="Cascadia Mono" panose="020B0609020000020004" pitchFamily="49" charset="0"/>
+              </a:rPr>
+              <a:t>public</a:t>
+            </a:r>
+            <a:r>
+              <a:rPr lang="en-US" sz="1200" dirty="0">
+                <a:solidFill>
+                  <a:srgbClr val="000000"/>
+                </a:solidFill>
+                <a:latin typeface="Cascadia Mono" panose="020B0609020000020004" pitchFamily="49" charset="0"/>
+              </a:rPr>
+              <a:t> </a:t>
+            </a:r>
+            <a:r>
+              <a:rPr lang="en-US" sz="1200" dirty="0">
+                <a:solidFill>
+                  <a:srgbClr val="0000FF"/>
+                </a:solidFill>
+                <a:latin typeface="Cascadia Mono" panose="020B0609020000020004" pitchFamily="49" charset="0"/>
+              </a:rPr>
+              <a:t>void</a:t>
+            </a:r>
+            <a:r>
+              <a:rPr lang="en-US" sz="1200" dirty="0">
+                <a:solidFill>
+                  <a:srgbClr val="000000"/>
+                </a:solidFill>
+                <a:latin typeface="Cascadia Mono" panose="020B0609020000020004" pitchFamily="49" charset="0"/>
+              </a:rPr>
+              <a:t> Start()</a:t>
             </a:r>
           </a:p>
           <a:p>
             <a:pPr algn="l" rtl="0"/>
             <a:r>
-              <a:rPr lang="en-US" sz="1400" dirty="0"/>
+              <a:rPr lang="en-IL" sz="1200" dirty="0">
+                <a:solidFill>
+                  <a:srgbClr val="000000"/>
+                </a:solidFill>
+                <a:latin typeface="Cascadia Mono" panose="020B0609020000020004" pitchFamily="49" charset="0"/>
+              </a:rPr>
               <a:t>        {</a:t>
             </a:r>
           </a:p>
           <a:p>
             <a:pPr algn="l" rtl="0"/>
             <a:r>
-              <a:rPr lang="en-US" sz="1400" dirty="0"/>
-              <a:t>            for (int </a:t>
-            </a:r>
-            <a:r>
-              <a:rPr lang="en-US" sz="1400" dirty="0" err="1"/>
+              <a:rPr lang="en-US" sz="1200" dirty="0">
+                <a:solidFill>
+                  <a:srgbClr val="000000"/>
+                </a:solidFill>
+                <a:latin typeface="Cascadia Mono" panose="020B0609020000020004" pitchFamily="49" charset="0"/>
+              </a:rPr>
+              <a:t>            </a:t>
+            </a:r>
+            <a:r>
+              <a:rPr lang="en-US" sz="1200" dirty="0">
+                <a:solidFill>
+                  <a:srgbClr val="808080"/>
+                </a:solidFill>
+                <a:latin typeface="Cascadia Mono" panose="020B0609020000020004" pitchFamily="49" charset="0"/>
+              </a:rPr>
+              <a:t>#region</a:t>
+            </a:r>
+            <a:r>
+              <a:rPr lang="en-US" sz="1200" dirty="0">
+                <a:solidFill>
+                  <a:srgbClr val="000000"/>
+                </a:solidFill>
+                <a:latin typeface="Cascadia Mono" panose="020B0609020000020004" pitchFamily="49" charset="0"/>
+              </a:rPr>
+              <a:t> With Events</a:t>
+            </a:r>
+          </a:p>
+          <a:p>
+            <a:pPr algn="l" rtl="0"/>
+            <a:r>
+              <a:rPr lang="nn-NO" sz="1200" dirty="0">
+                <a:solidFill>
+                  <a:srgbClr val="000000"/>
+                </a:solidFill>
+                <a:latin typeface="Cascadia Mono" panose="020B0609020000020004" pitchFamily="49" charset="0"/>
+              </a:rPr>
+              <a:t>            </a:t>
+            </a:r>
+            <a:r>
+              <a:rPr lang="nn-NO" sz="1200" dirty="0">
+                <a:solidFill>
+                  <a:srgbClr val="0000FF"/>
+                </a:solidFill>
+                <a:latin typeface="Cascadia Mono" panose="020B0609020000020004" pitchFamily="49" charset="0"/>
+              </a:rPr>
+              <a:t>for</a:t>
+            </a:r>
+            <a:r>
+              <a:rPr lang="nn-NO" sz="1200" dirty="0">
+                <a:solidFill>
+                  <a:srgbClr val="000000"/>
+                </a:solidFill>
+                <a:latin typeface="Cascadia Mono" panose="020B0609020000020004" pitchFamily="49" charset="0"/>
+              </a:rPr>
+              <a:t> (</a:t>
+            </a:r>
+            <a:r>
+              <a:rPr lang="nn-NO" sz="1200" dirty="0">
+                <a:solidFill>
+                  <a:srgbClr val="0000FF"/>
+                </a:solidFill>
+                <a:latin typeface="Cascadia Mono" panose="020B0609020000020004" pitchFamily="49" charset="0"/>
+              </a:rPr>
+              <a:t>int</a:t>
+            </a:r>
+            <a:r>
+              <a:rPr lang="nn-NO" sz="1200" dirty="0">
+                <a:solidFill>
+                  <a:srgbClr val="000000"/>
+                </a:solidFill>
+                <a:latin typeface="Cascadia Mono" panose="020B0609020000020004" pitchFamily="49" charset="0"/>
+              </a:rPr>
+              <a:t> i = 0; i &lt; 25; i++)</a:t>
+            </a:r>
+          </a:p>
+          <a:p>
+            <a:pPr algn="l" rtl="0"/>
+            <a:r>
+              <a:rPr lang="en-IL" sz="1200" dirty="0">
+                <a:solidFill>
+                  <a:srgbClr val="000000"/>
+                </a:solidFill>
+                <a:latin typeface="Cascadia Mono" panose="020B0609020000020004" pitchFamily="49" charset="0"/>
+              </a:rPr>
+              <a:t>            {</a:t>
+            </a:r>
+          </a:p>
+          <a:p>
+            <a:pPr algn="l" rtl="0"/>
+            <a:r>
+              <a:rPr lang="en-US" sz="1200" dirty="0">
+                <a:solidFill>
+                  <a:srgbClr val="000000"/>
+                </a:solidFill>
+                <a:latin typeface="Cascadia Mono" panose="020B0609020000020004" pitchFamily="49" charset="0"/>
+              </a:rPr>
+              <a:t>                </a:t>
+            </a:r>
+            <a:r>
+              <a:rPr lang="en-US" sz="1200" dirty="0" err="1">
+                <a:solidFill>
+                  <a:srgbClr val="000000"/>
+                </a:solidFill>
+                <a:latin typeface="Cascadia Mono" panose="020B0609020000020004" pitchFamily="49" charset="0"/>
+              </a:rPr>
+              <a:t>Thread.Sleep</a:t>
+            </a:r>
+            <a:r>
+              <a:rPr lang="en-US" sz="1200" dirty="0">
+                <a:solidFill>
+                  <a:srgbClr val="000000"/>
+                </a:solidFill>
+                <a:latin typeface="Cascadia Mono" panose="020B0609020000020004" pitchFamily="49" charset="0"/>
+              </a:rPr>
+              <a:t>(</a:t>
+            </a:r>
+            <a:r>
+              <a:rPr lang="en-US" sz="1200" dirty="0" err="1">
+                <a:solidFill>
+                  <a:srgbClr val="0000FF"/>
+                </a:solidFill>
+                <a:latin typeface="Cascadia Mono" panose="020B0609020000020004" pitchFamily="49" charset="0"/>
+              </a:rPr>
+              <a:t>this</a:t>
+            </a:r>
+            <a:r>
+              <a:rPr lang="en-US" sz="1200" dirty="0" err="1">
+                <a:solidFill>
+                  <a:srgbClr val="000000"/>
+                </a:solidFill>
+                <a:latin typeface="Cascadia Mono" panose="020B0609020000020004" pitchFamily="49" charset="0"/>
+              </a:rPr>
+              <a:t>.timeInMiliSec</a:t>
+            </a:r>
+            <a:r>
+              <a:rPr lang="en-US" sz="1200" dirty="0">
+                <a:solidFill>
+                  <a:srgbClr val="000000"/>
+                </a:solidFill>
+                <a:latin typeface="Cascadia Mono" panose="020B0609020000020004" pitchFamily="49" charset="0"/>
+              </a:rPr>
+              <a:t> / 25);</a:t>
+            </a:r>
+          </a:p>
+          <a:p>
+            <a:pPr algn="l" rtl="0"/>
+            <a:r>
+              <a:rPr lang="en-US" sz="1200" dirty="0">
+                <a:solidFill>
+                  <a:srgbClr val="000000"/>
+                </a:solidFill>
+                <a:latin typeface="Cascadia Mono" panose="020B0609020000020004" pitchFamily="49" charset="0"/>
+              </a:rPr>
+              <a:t>                </a:t>
+            </a:r>
+            <a:r>
+              <a:rPr lang="en-US" sz="1200" dirty="0">
+                <a:solidFill>
+                  <a:srgbClr val="0000FF"/>
+                </a:solidFill>
+                <a:latin typeface="Cascadia Mono" panose="020B0609020000020004" pitchFamily="49" charset="0"/>
+              </a:rPr>
+              <a:t>if</a:t>
+            </a:r>
+            <a:r>
+              <a:rPr lang="en-US" sz="1200" dirty="0">
+                <a:solidFill>
+                  <a:srgbClr val="000000"/>
+                </a:solidFill>
+                <a:latin typeface="Cascadia Mono" panose="020B0609020000020004" pitchFamily="49" charset="0"/>
+              </a:rPr>
+              <a:t> (</a:t>
+            </a:r>
+            <a:r>
+              <a:rPr lang="en-US" sz="1200" dirty="0" err="1">
+                <a:solidFill>
+                  <a:srgbClr val="000000"/>
+                </a:solidFill>
+                <a:latin typeface="Cascadia Mono" panose="020B0609020000020004" pitchFamily="49" charset="0"/>
+              </a:rPr>
+              <a:t>OnProgressUpdate</a:t>
+            </a:r>
+            <a:r>
+              <a:rPr lang="en-US" sz="1200" dirty="0">
+                <a:solidFill>
+                  <a:srgbClr val="000000"/>
+                </a:solidFill>
+                <a:latin typeface="Cascadia Mono" panose="020B0609020000020004" pitchFamily="49" charset="0"/>
+              </a:rPr>
+              <a:t> != </a:t>
+            </a:r>
+            <a:r>
+              <a:rPr lang="en-US" sz="1200" dirty="0">
+                <a:solidFill>
+                  <a:srgbClr val="0000FF"/>
+                </a:solidFill>
+                <a:latin typeface="Cascadia Mono" panose="020B0609020000020004" pitchFamily="49" charset="0"/>
+              </a:rPr>
+              <a:t>null</a:t>
+            </a:r>
+            <a:r>
+              <a:rPr lang="en-US" sz="1200" dirty="0">
+                <a:solidFill>
+                  <a:srgbClr val="000000"/>
+                </a:solidFill>
+                <a:latin typeface="Cascadia Mono" panose="020B0609020000020004" pitchFamily="49" charset="0"/>
+              </a:rPr>
+              <a:t>)</a:t>
+            </a:r>
+          </a:p>
+          <a:p>
+            <a:pPr algn="l" rtl="0"/>
+            <a:r>
+              <a:rPr lang="en-US" sz="1200" dirty="0">
+                <a:solidFill>
+                  <a:srgbClr val="000000"/>
+                </a:solidFill>
+                <a:latin typeface="Cascadia Mono" panose="020B0609020000020004" pitchFamily="49" charset="0"/>
+              </a:rPr>
+              <a:t>                    </a:t>
+            </a:r>
+            <a:r>
+              <a:rPr lang="en-US" sz="1200" dirty="0" err="1">
+                <a:solidFill>
+                  <a:srgbClr val="000000"/>
+                </a:solidFill>
+                <a:latin typeface="Cascadia Mono" panose="020B0609020000020004" pitchFamily="49" charset="0"/>
+              </a:rPr>
+              <a:t>OnProgressUpdate</a:t>
+            </a:r>
+            <a:r>
+              <a:rPr lang="en-US" sz="1200" dirty="0">
+                <a:solidFill>
+                  <a:srgbClr val="000000"/>
+                </a:solidFill>
+                <a:latin typeface="Cascadia Mono" panose="020B0609020000020004" pitchFamily="49" charset="0"/>
+              </a:rPr>
+              <a:t>(</a:t>
+            </a:r>
+            <a:r>
+              <a:rPr lang="en-US" sz="1200" dirty="0">
+                <a:solidFill>
+                  <a:srgbClr val="0000FF"/>
+                </a:solidFill>
+                <a:latin typeface="Cascadia Mono" panose="020B0609020000020004" pitchFamily="49" charset="0"/>
+              </a:rPr>
+              <a:t>this</a:t>
+            </a:r>
+            <a:r>
+              <a:rPr lang="en-US" sz="1200" dirty="0">
+                <a:solidFill>
+                  <a:srgbClr val="000000"/>
+                </a:solidFill>
+                <a:latin typeface="Cascadia Mono" panose="020B0609020000020004" pitchFamily="49" charset="0"/>
+              </a:rPr>
+              <a:t>, (</a:t>
+            </a:r>
+            <a:r>
+              <a:rPr lang="en-US" sz="1200" dirty="0" err="1">
+                <a:solidFill>
+                  <a:srgbClr val="000000"/>
+                </a:solidFill>
+                <a:latin typeface="Cascadia Mono" panose="020B0609020000020004" pitchFamily="49" charset="0"/>
+              </a:rPr>
               <a:t>i</a:t>
             </a:r>
             <a:r>
-              <a:rPr lang="en-US" sz="1400" dirty="0"/>
-              <a:t> = 0; </a:t>
-            </a:r>
-            <a:r>
-              <a:rPr lang="en-US" sz="1400" dirty="0" err="1"/>
-              <a:t>i</a:t>
-            </a:r>
-            <a:r>
-              <a:rPr lang="en-US" sz="1400" dirty="0"/>
-              <a:t> &lt; 10; </a:t>
-            </a:r>
-            <a:r>
-              <a:rPr lang="en-US" sz="1400" dirty="0" err="1"/>
-              <a:t>i</a:t>
-            </a:r>
-            <a:r>
-              <a:rPr lang="en-US" sz="1400" dirty="0"/>
-              <a:t>++)</a:t>
+              <a:rPr lang="en-US" sz="1200" dirty="0">
+                <a:solidFill>
+                  <a:srgbClr val="000000"/>
+                </a:solidFill>
+                <a:latin typeface="Cascadia Mono" panose="020B0609020000020004" pitchFamily="49" charset="0"/>
+              </a:rPr>
+              <a:t> + 1) * 4);</a:t>
             </a:r>
           </a:p>
           <a:p>
             <a:pPr algn="l" rtl="0"/>
             <a:r>
-              <a:rPr lang="en-US" sz="1400" dirty="0"/>
-              <a:t>            {</a:t>
+              <a:rPr lang="en-IL" sz="1200" dirty="0">
+                <a:solidFill>
+                  <a:srgbClr val="000000"/>
+                </a:solidFill>
+                <a:latin typeface="Cascadia Mono" panose="020B0609020000020004" pitchFamily="49" charset="0"/>
+              </a:rPr>
+              <a:t>            }</a:t>
             </a:r>
           </a:p>
           <a:p>
             <a:pPr algn="l" rtl="0"/>
             <a:r>
-              <a:rPr lang="en-US" sz="1400" dirty="0"/>
+              <a:rPr lang="en-US" sz="1200" dirty="0">
+                <a:solidFill>
+                  <a:srgbClr val="000000"/>
+                </a:solidFill>
+                <a:latin typeface="Cascadia Mono" panose="020B0609020000020004" pitchFamily="49" charset="0"/>
+              </a:rPr>
+              <a:t>            </a:t>
+            </a:r>
+            <a:r>
+              <a:rPr lang="en-US" sz="1200" dirty="0">
+                <a:solidFill>
+                  <a:srgbClr val="0000FF"/>
+                </a:solidFill>
+                <a:latin typeface="Cascadia Mono" panose="020B0609020000020004" pitchFamily="49" charset="0"/>
+              </a:rPr>
+              <a:t>if</a:t>
+            </a:r>
+            <a:r>
+              <a:rPr lang="en-US" sz="1200" dirty="0">
+                <a:solidFill>
+                  <a:srgbClr val="000000"/>
+                </a:solidFill>
+                <a:latin typeface="Cascadia Mono" panose="020B0609020000020004" pitchFamily="49" charset="0"/>
+              </a:rPr>
+              <a:t> (</a:t>
+            </a:r>
+            <a:r>
+              <a:rPr lang="en-US" sz="1200" dirty="0" err="1">
+                <a:solidFill>
+                  <a:srgbClr val="000000"/>
+                </a:solidFill>
+                <a:latin typeface="Cascadia Mono" panose="020B0609020000020004" pitchFamily="49" charset="0"/>
+              </a:rPr>
+              <a:t>OnFinish</a:t>
+            </a:r>
+            <a:r>
+              <a:rPr lang="en-US" sz="1200" dirty="0">
+                <a:solidFill>
+                  <a:srgbClr val="000000"/>
+                </a:solidFill>
+                <a:latin typeface="Cascadia Mono" panose="020B0609020000020004" pitchFamily="49" charset="0"/>
+              </a:rPr>
+              <a:t> != </a:t>
+            </a:r>
+            <a:r>
+              <a:rPr lang="en-US" sz="1200" dirty="0">
+                <a:solidFill>
+                  <a:srgbClr val="0000FF"/>
+                </a:solidFill>
+                <a:latin typeface="Cascadia Mono" panose="020B0609020000020004" pitchFamily="49" charset="0"/>
+              </a:rPr>
+              <a:t>null</a:t>
+            </a:r>
+            <a:r>
+              <a:rPr lang="en-US" sz="1200" dirty="0">
+                <a:solidFill>
+                  <a:srgbClr val="000000"/>
+                </a:solidFill>
+                <a:latin typeface="Cascadia Mono" panose="020B0609020000020004" pitchFamily="49" charset="0"/>
+              </a:rPr>
+              <a:t>)</a:t>
+            </a:r>
+          </a:p>
+          <a:p>
+            <a:pPr algn="l" rtl="0"/>
+            <a:r>
+              <a:rPr lang="en-US" sz="1200" dirty="0">
+                <a:solidFill>
+                  <a:srgbClr val="000000"/>
+                </a:solidFill>
+                <a:latin typeface="Cascadia Mono" panose="020B0609020000020004" pitchFamily="49" charset="0"/>
+              </a:rPr>
               <a:t>                </a:t>
             </a:r>
             <a:r>
-              <a:rPr lang="en-US" sz="1400" dirty="0" err="1"/>
-              <a:t>Thread.Sleep</a:t>
-            </a:r>
-            <a:r>
-              <a:rPr lang="en-US" sz="1400" dirty="0"/>
+              <a:rPr lang="en-US" sz="1200" dirty="0" err="1">
+                <a:solidFill>
+                  <a:srgbClr val="000000"/>
+                </a:solidFill>
+                <a:latin typeface="Cascadia Mono" panose="020B0609020000020004" pitchFamily="49" charset="0"/>
+              </a:rPr>
+              <a:t>OnFinish</a:t>
+            </a:r>
+            <a:r>
+              <a:rPr lang="en-US" sz="1200" dirty="0">
+                <a:solidFill>
+                  <a:srgbClr val="000000"/>
+                </a:solidFill>
+                <a:latin typeface="Cascadia Mono" panose="020B0609020000020004" pitchFamily="49" charset="0"/>
+              </a:rPr>
               <a:t>(</a:t>
             </a:r>
             <a:r>
-              <a:rPr lang="en-US" sz="1400" dirty="0" err="1"/>
-              <a:t>this.timeInMiliSec</a:t>
-            </a:r>
-            <a:r>
-              <a:rPr lang="en-US" sz="1400" dirty="0"/>
-              <a:t> / 10);</a:t>
+              <a:rPr lang="en-US" sz="1200" dirty="0">
+                <a:solidFill>
+                  <a:srgbClr val="0000FF"/>
+                </a:solidFill>
+                <a:latin typeface="Cascadia Mono" panose="020B0609020000020004" pitchFamily="49" charset="0"/>
+              </a:rPr>
+              <a:t>this</a:t>
+            </a:r>
+            <a:r>
+              <a:rPr lang="en-US" sz="1200" dirty="0">
+                <a:solidFill>
+                  <a:srgbClr val="000000"/>
+                </a:solidFill>
+                <a:latin typeface="Cascadia Mono" panose="020B0609020000020004" pitchFamily="49" charset="0"/>
+              </a:rPr>
+              <a:t>);</a:t>
             </a:r>
           </a:p>
           <a:p>
             <a:pPr algn="l" rtl="0"/>
             <a:r>
-              <a:rPr lang="en-US" sz="1400" dirty="0"/>
-              <a:t>                if (</a:t>
-            </a:r>
-            <a:r>
-              <a:rPr lang="en-US" sz="1400" dirty="0" err="1"/>
+              <a:rPr lang="en-US" sz="1200" dirty="0">
+                <a:solidFill>
+                  <a:srgbClr val="000000"/>
+                </a:solidFill>
+                <a:latin typeface="Cascadia Mono" panose="020B0609020000020004" pitchFamily="49" charset="0"/>
+              </a:rPr>
+              <a:t>            </a:t>
+            </a:r>
+            <a:r>
+              <a:rPr lang="en-US" sz="1200" dirty="0">
+                <a:solidFill>
+                  <a:srgbClr val="808080"/>
+                </a:solidFill>
+                <a:latin typeface="Cascadia Mono" panose="020B0609020000020004" pitchFamily="49" charset="0"/>
+              </a:rPr>
+              <a:t>#endregion</a:t>
+            </a:r>
+            <a:endParaRPr lang="en-US" sz="1200" dirty="0">
+              <a:solidFill>
+                <a:srgbClr val="000000"/>
+              </a:solidFill>
+              <a:latin typeface="Cascadia Mono" panose="020B0609020000020004" pitchFamily="49" charset="0"/>
+            </a:endParaRPr>
+          </a:p>
+          <a:p>
+            <a:pPr algn="l" rtl="0"/>
+            <a:r>
+              <a:rPr lang="en-IL" sz="1200" dirty="0">
+                <a:solidFill>
+                  <a:srgbClr val="000000"/>
+                </a:solidFill>
+                <a:latin typeface="Cascadia Mono" panose="020B0609020000020004" pitchFamily="49" charset="0"/>
+              </a:rPr>
+              <a:t>        }</a:t>
+            </a:r>
+          </a:p>
+          <a:p>
+            <a:pPr algn="l" rtl="0"/>
+            <a:r>
+              <a:rPr lang="en-US" sz="1200" dirty="0">
+                <a:solidFill>
+                  <a:srgbClr val="000000"/>
+                </a:solidFill>
+                <a:latin typeface="Cascadia Mono" panose="020B0609020000020004" pitchFamily="49" charset="0"/>
+              </a:rPr>
+              <a:t>        </a:t>
+            </a:r>
+            <a:r>
+              <a:rPr lang="en-US" sz="1200" dirty="0">
+                <a:solidFill>
+                  <a:srgbClr val="808080"/>
+                </a:solidFill>
+                <a:latin typeface="Cascadia Mono" panose="020B0609020000020004" pitchFamily="49" charset="0"/>
+              </a:rPr>
+              <a:t>#region</a:t>
+            </a:r>
+            <a:r>
+              <a:rPr lang="en-US" sz="1200" dirty="0">
+                <a:solidFill>
+                  <a:srgbClr val="000000"/>
+                </a:solidFill>
+                <a:latin typeface="Cascadia Mono" panose="020B0609020000020004" pitchFamily="49" charset="0"/>
+              </a:rPr>
+              <a:t> With Events</a:t>
+            </a:r>
+          </a:p>
+          <a:p>
+            <a:pPr algn="l" rtl="0"/>
+            <a:r>
+              <a:rPr lang="en-US" sz="1200" dirty="0">
+                <a:solidFill>
+                  <a:srgbClr val="000000"/>
+                </a:solidFill>
+                <a:latin typeface="Cascadia Mono" panose="020B0609020000020004" pitchFamily="49" charset="0"/>
+              </a:rPr>
+              <a:t>        </a:t>
+            </a:r>
+            <a:r>
+              <a:rPr lang="en-US" sz="1200" dirty="0">
+                <a:solidFill>
+                  <a:srgbClr val="0000FF"/>
+                </a:solidFill>
+                <a:latin typeface="Cascadia Mono" panose="020B0609020000020004" pitchFamily="49" charset="0"/>
+              </a:rPr>
+              <a:t>public</a:t>
+            </a:r>
+            <a:r>
+              <a:rPr lang="en-US" sz="1200" dirty="0">
+                <a:solidFill>
+                  <a:srgbClr val="000000"/>
+                </a:solidFill>
+                <a:latin typeface="Cascadia Mono" panose="020B0609020000020004" pitchFamily="49" charset="0"/>
+              </a:rPr>
+              <a:t> </a:t>
+            </a:r>
+            <a:r>
+              <a:rPr lang="en-US" sz="1200" dirty="0">
+                <a:solidFill>
+                  <a:srgbClr val="0000FF"/>
+                </a:solidFill>
+                <a:latin typeface="Cascadia Mono" panose="020B0609020000020004" pitchFamily="49" charset="0"/>
+              </a:rPr>
+              <a:t>delegate</a:t>
+            </a:r>
+            <a:r>
+              <a:rPr lang="en-US" sz="1200" dirty="0">
+                <a:solidFill>
+                  <a:srgbClr val="000000"/>
+                </a:solidFill>
+                <a:latin typeface="Cascadia Mono" panose="020B0609020000020004" pitchFamily="49" charset="0"/>
+              </a:rPr>
+              <a:t> </a:t>
+            </a:r>
+            <a:r>
+              <a:rPr lang="en-US" sz="1200" dirty="0">
+                <a:solidFill>
+                  <a:srgbClr val="0000FF"/>
+                </a:solidFill>
+                <a:latin typeface="Cascadia Mono" panose="020B0609020000020004" pitchFamily="49" charset="0"/>
+              </a:rPr>
+              <a:t>void</a:t>
+            </a:r>
+            <a:r>
+              <a:rPr lang="en-US" sz="1200" dirty="0">
+                <a:solidFill>
+                  <a:srgbClr val="000000"/>
+                </a:solidFill>
+                <a:latin typeface="Cascadia Mono" panose="020B0609020000020004" pitchFamily="49" charset="0"/>
+              </a:rPr>
+              <a:t> </a:t>
+            </a:r>
+            <a:r>
+              <a:rPr lang="en-US" sz="1200" dirty="0" err="1">
+                <a:solidFill>
+                  <a:srgbClr val="2B91AF"/>
+                </a:solidFill>
+                <a:latin typeface="Cascadia Mono" panose="020B0609020000020004" pitchFamily="49" charset="0"/>
+              </a:rPr>
+              <a:t>ProgressEventHandler</a:t>
+            </a:r>
+            <a:r>
+              <a:rPr lang="en-US" sz="1200" dirty="0">
+                <a:solidFill>
+                  <a:srgbClr val="000000"/>
+                </a:solidFill>
+                <a:latin typeface="Cascadia Mono" panose="020B0609020000020004" pitchFamily="49" charset="0"/>
+              </a:rPr>
+              <a:t>(Object sender, </a:t>
+            </a:r>
+            <a:r>
+              <a:rPr lang="en-US" sz="1200" dirty="0">
+                <a:solidFill>
+                  <a:srgbClr val="0000FF"/>
+                </a:solidFill>
+                <a:latin typeface="Cascadia Mono" panose="020B0609020000020004" pitchFamily="49" charset="0"/>
+              </a:rPr>
+              <a:t>int</a:t>
+            </a:r>
+            <a:r>
+              <a:rPr lang="en-US" sz="1200" dirty="0">
+                <a:solidFill>
+                  <a:srgbClr val="000000"/>
+                </a:solidFill>
+                <a:latin typeface="Cascadia Mono" panose="020B0609020000020004" pitchFamily="49" charset="0"/>
+              </a:rPr>
+              <a:t> percent);</a:t>
+            </a:r>
+          </a:p>
+          <a:p>
+            <a:pPr algn="l" rtl="0"/>
+            <a:r>
+              <a:rPr lang="en-US" sz="1200" dirty="0">
+                <a:solidFill>
+                  <a:srgbClr val="000000"/>
+                </a:solidFill>
+                <a:latin typeface="Cascadia Mono" panose="020B0609020000020004" pitchFamily="49" charset="0"/>
+              </a:rPr>
+              <a:t>        </a:t>
+            </a:r>
+            <a:r>
+              <a:rPr lang="en-US" sz="1200" dirty="0">
+                <a:solidFill>
+                  <a:srgbClr val="0000FF"/>
+                </a:solidFill>
+                <a:latin typeface="Cascadia Mono" panose="020B0609020000020004" pitchFamily="49" charset="0"/>
+              </a:rPr>
+              <a:t>public</a:t>
+            </a:r>
+            <a:r>
+              <a:rPr lang="en-US" sz="1200" dirty="0">
+                <a:solidFill>
+                  <a:srgbClr val="000000"/>
+                </a:solidFill>
+                <a:latin typeface="Cascadia Mono" panose="020B0609020000020004" pitchFamily="49" charset="0"/>
+              </a:rPr>
+              <a:t> </a:t>
+            </a:r>
+            <a:r>
+              <a:rPr lang="en-US" sz="1200" dirty="0">
+                <a:solidFill>
+                  <a:srgbClr val="0000FF"/>
+                </a:solidFill>
+                <a:latin typeface="Cascadia Mono" panose="020B0609020000020004" pitchFamily="49" charset="0"/>
+              </a:rPr>
+              <a:t>event</a:t>
+            </a:r>
+            <a:r>
+              <a:rPr lang="en-US" sz="1200" dirty="0">
+                <a:solidFill>
+                  <a:srgbClr val="000000"/>
+                </a:solidFill>
+                <a:latin typeface="Cascadia Mono" panose="020B0609020000020004" pitchFamily="49" charset="0"/>
+              </a:rPr>
+              <a:t> </a:t>
+            </a:r>
+            <a:r>
+              <a:rPr lang="en-US" sz="1200" dirty="0" err="1">
+                <a:solidFill>
+                  <a:srgbClr val="000000"/>
+                </a:solidFill>
+                <a:latin typeface="Cascadia Mono" panose="020B0609020000020004" pitchFamily="49" charset="0"/>
+              </a:rPr>
+              <a:t>ProgressEventHandler</a:t>
+            </a:r>
+            <a:r>
+              <a:rPr lang="en-US" sz="1200" dirty="0">
+                <a:solidFill>
+                  <a:srgbClr val="000000"/>
+                </a:solidFill>
+                <a:latin typeface="Cascadia Mono" panose="020B0609020000020004" pitchFamily="49" charset="0"/>
+              </a:rPr>
+              <a:t> </a:t>
+            </a:r>
+            <a:r>
+              <a:rPr lang="en-US" sz="1200" dirty="0" err="1">
+                <a:solidFill>
+                  <a:srgbClr val="000000"/>
+                </a:solidFill>
+                <a:latin typeface="Cascadia Mono" panose="020B0609020000020004" pitchFamily="49" charset="0"/>
+              </a:rPr>
               <a:t>OnProgressUpdate</a:t>
             </a:r>
             <a:r>
-              <a:rPr lang="en-US" sz="1400" dirty="0"/>
-              <a:t> != null)</a:t>
+              <a:rPr lang="en-US" sz="1200" dirty="0">
+                <a:solidFill>
+                  <a:srgbClr val="000000"/>
+                </a:solidFill>
+                <a:latin typeface="Cascadia Mono" panose="020B0609020000020004" pitchFamily="49" charset="0"/>
+              </a:rPr>
+              <a:t>;</a:t>
             </a:r>
           </a:p>
           <a:p>
             <a:pPr algn="l" rtl="0"/>
-            <a:r>
-              <a:rPr lang="en-US" sz="1400" dirty="0"/>
-              <a:t>                    </a:t>
-            </a:r>
-            <a:r>
-              <a:rPr lang="en-US" sz="1400" dirty="0" err="1"/>
-              <a:t>OnProgressUpdate</a:t>
-            </a:r>
-            <a:r>
-              <a:rPr lang="en-US" sz="1400" dirty="0"/>
-              <a:t>(this, (i+1) * 10);</a:t>
-            </a:r>
+            <a:endParaRPr lang="en-IL" sz="1200" dirty="0">
+              <a:solidFill>
+                <a:srgbClr val="000000"/>
+              </a:solidFill>
+              <a:latin typeface="Cascadia Mono" panose="020B0609020000020004" pitchFamily="49" charset="0"/>
+            </a:endParaRPr>
           </a:p>
           <a:p>
             <a:pPr algn="l" rtl="0"/>
             <a:r>
-              <a:rPr lang="en-US" sz="1400" dirty="0"/>
-              <a:t>            }</a:t>
+              <a:rPr lang="en-US" sz="1200" dirty="0">
+                <a:solidFill>
+                  <a:srgbClr val="000000"/>
+                </a:solidFill>
+                <a:latin typeface="Cascadia Mono" panose="020B0609020000020004" pitchFamily="49" charset="0"/>
+              </a:rPr>
+              <a:t>        </a:t>
+            </a:r>
+            <a:r>
+              <a:rPr lang="en-US" sz="1200" dirty="0">
+                <a:solidFill>
+                  <a:srgbClr val="0000FF"/>
+                </a:solidFill>
+                <a:latin typeface="Cascadia Mono" panose="020B0609020000020004" pitchFamily="49" charset="0"/>
+              </a:rPr>
+              <a:t>public</a:t>
+            </a:r>
+            <a:r>
+              <a:rPr lang="en-US" sz="1200" dirty="0">
+                <a:solidFill>
+                  <a:srgbClr val="000000"/>
+                </a:solidFill>
+                <a:latin typeface="Cascadia Mono" panose="020B0609020000020004" pitchFamily="49" charset="0"/>
+              </a:rPr>
+              <a:t> </a:t>
+            </a:r>
+            <a:r>
+              <a:rPr lang="en-US" sz="1200" dirty="0">
+                <a:solidFill>
+                  <a:srgbClr val="0000FF"/>
+                </a:solidFill>
+                <a:latin typeface="Cascadia Mono" panose="020B0609020000020004" pitchFamily="49" charset="0"/>
+              </a:rPr>
+              <a:t>delegate</a:t>
+            </a:r>
+            <a:r>
+              <a:rPr lang="en-US" sz="1200" dirty="0">
+                <a:solidFill>
+                  <a:srgbClr val="000000"/>
+                </a:solidFill>
+                <a:latin typeface="Cascadia Mono" panose="020B0609020000020004" pitchFamily="49" charset="0"/>
+              </a:rPr>
+              <a:t> </a:t>
+            </a:r>
+            <a:r>
+              <a:rPr lang="en-US" sz="1200" dirty="0">
+                <a:solidFill>
+                  <a:srgbClr val="0000FF"/>
+                </a:solidFill>
+                <a:latin typeface="Cascadia Mono" panose="020B0609020000020004" pitchFamily="49" charset="0"/>
+              </a:rPr>
+              <a:t>void</a:t>
+            </a:r>
+            <a:r>
+              <a:rPr lang="en-US" sz="1200" dirty="0">
+                <a:solidFill>
+                  <a:srgbClr val="000000"/>
+                </a:solidFill>
+                <a:latin typeface="Cascadia Mono" panose="020B0609020000020004" pitchFamily="49" charset="0"/>
+              </a:rPr>
+              <a:t> </a:t>
+            </a:r>
+            <a:r>
+              <a:rPr lang="en-US" sz="1200" dirty="0" err="1">
+                <a:solidFill>
+                  <a:srgbClr val="2B91AF"/>
+                </a:solidFill>
+                <a:latin typeface="Cascadia Mono" panose="020B0609020000020004" pitchFamily="49" charset="0"/>
+              </a:rPr>
+              <a:t>TaskDoneEventHandler</a:t>
+            </a:r>
+            <a:r>
+              <a:rPr lang="en-US" sz="1200" dirty="0">
+                <a:solidFill>
+                  <a:srgbClr val="000000"/>
+                </a:solidFill>
+                <a:latin typeface="Cascadia Mono" panose="020B0609020000020004" pitchFamily="49" charset="0"/>
+              </a:rPr>
+              <a:t>(Object sender);</a:t>
             </a:r>
           </a:p>
           <a:p>
             <a:pPr algn="l" rtl="0"/>
             <a:r>
-              <a:rPr lang="en-US" sz="1400" dirty="0"/>
-              <a:t>            if (</a:t>
-            </a:r>
-            <a:r>
-              <a:rPr lang="en-US" sz="1400" dirty="0" err="1"/>
+              <a:rPr lang="en-US" sz="1200" dirty="0">
+                <a:solidFill>
+                  <a:srgbClr val="000000"/>
+                </a:solidFill>
+                <a:latin typeface="Cascadia Mono" panose="020B0609020000020004" pitchFamily="49" charset="0"/>
+              </a:rPr>
+              <a:t>        </a:t>
+            </a:r>
+            <a:r>
+              <a:rPr lang="en-US" sz="1200" dirty="0">
+                <a:solidFill>
+                  <a:srgbClr val="0000FF"/>
+                </a:solidFill>
+                <a:latin typeface="Cascadia Mono" panose="020B0609020000020004" pitchFamily="49" charset="0"/>
+              </a:rPr>
+              <a:t>public</a:t>
+            </a:r>
+            <a:r>
+              <a:rPr lang="en-US" sz="1200" dirty="0">
+                <a:solidFill>
+                  <a:srgbClr val="000000"/>
+                </a:solidFill>
+                <a:latin typeface="Cascadia Mono" panose="020B0609020000020004" pitchFamily="49" charset="0"/>
+              </a:rPr>
+              <a:t> </a:t>
+            </a:r>
+            <a:r>
+              <a:rPr lang="en-US" sz="1200" dirty="0">
+                <a:solidFill>
+                  <a:srgbClr val="0000FF"/>
+                </a:solidFill>
+                <a:latin typeface="Cascadia Mono" panose="020B0609020000020004" pitchFamily="49" charset="0"/>
+              </a:rPr>
+              <a:t>event</a:t>
+            </a:r>
+            <a:r>
+              <a:rPr lang="en-US" sz="1200" dirty="0">
+                <a:solidFill>
+                  <a:srgbClr val="000000"/>
+                </a:solidFill>
+                <a:latin typeface="Cascadia Mono" panose="020B0609020000020004" pitchFamily="49" charset="0"/>
+              </a:rPr>
+              <a:t> </a:t>
+            </a:r>
+            <a:r>
+              <a:rPr lang="en-US" sz="1200" dirty="0" err="1">
+                <a:solidFill>
+                  <a:srgbClr val="000000"/>
+                </a:solidFill>
+                <a:latin typeface="Cascadia Mono" panose="020B0609020000020004" pitchFamily="49" charset="0"/>
+              </a:rPr>
+              <a:t>TaskDoneEventHandler</a:t>
+            </a:r>
+            <a:r>
+              <a:rPr lang="en-US" sz="1200" dirty="0">
+                <a:solidFill>
+                  <a:srgbClr val="000000"/>
+                </a:solidFill>
+                <a:latin typeface="Cascadia Mono" panose="020B0609020000020004" pitchFamily="49" charset="0"/>
+              </a:rPr>
+              <a:t> </a:t>
+            </a:r>
+            <a:r>
+              <a:rPr lang="en-US" sz="1200" dirty="0" err="1">
+                <a:solidFill>
+                  <a:srgbClr val="000000"/>
+                </a:solidFill>
+                <a:latin typeface="Cascadia Mono" panose="020B0609020000020004" pitchFamily="49" charset="0"/>
+              </a:rPr>
               <a:t>OnFinish</a:t>
             </a:r>
             <a:r>
-              <a:rPr lang="en-US" sz="1400" dirty="0"/>
-              <a:t> != null)</a:t>
+              <a:rPr lang="en-US" sz="1200" dirty="0">
+                <a:solidFill>
+                  <a:srgbClr val="000000"/>
+                </a:solidFill>
+                <a:latin typeface="Cascadia Mono" panose="020B0609020000020004" pitchFamily="49" charset="0"/>
+              </a:rPr>
+              <a:t>;</a:t>
             </a:r>
           </a:p>
           <a:p>
             <a:pPr algn="l" rtl="0"/>
             <a:r>
-              <a:rPr lang="en-US" sz="1400" dirty="0"/>
-              <a:t>                </a:t>
-            </a:r>
-            <a:r>
-              <a:rPr lang="en-US" sz="1400" dirty="0" err="1"/>
-              <a:t>OnFinish</a:t>
-            </a:r>
-            <a:r>
-              <a:rPr lang="en-US" sz="1400" dirty="0"/>
-              <a:t>(this);</a:t>
-            </a:r>
+              <a:rPr lang="en-US" sz="1200" dirty="0">
+                <a:solidFill>
+                  <a:srgbClr val="000000"/>
+                </a:solidFill>
+                <a:latin typeface="Cascadia Mono" panose="020B0609020000020004" pitchFamily="49" charset="0"/>
+              </a:rPr>
+              <a:t>        </a:t>
+            </a:r>
+            <a:r>
+              <a:rPr lang="en-US" sz="1200" dirty="0">
+                <a:solidFill>
+                  <a:srgbClr val="808080"/>
+                </a:solidFill>
+                <a:latin typeface="Cascadia Mono" panose="020B0609020000020004" pitchFamily="49" charset="0"/>
+              </a:rPr>
+              <a:t>#endregion</a:t>
+            </a:r>
+            <a:endParaRPr lang="en-US" sz="1200" dirty="0">
+              <a:solidFill>
+                <a:srgbClr val="000000"/>
+              </a:solidFill>
+              <a:latin typeface="Cascadia Mono" panose="020B0609020000020004" pitchFamily="49" charset="0"/>
+            </a:endParaRPr>
           </a:p>
           <a:p>
             <a:pPr algn="l" rtl="0"/>
             <a:r>
-              <a:rPr lang="en-US" sz="1400" dirty="0"/>
-              <a:t>        }</a:t>
-            </a:r>
-          </a:p>
-          <a:p>
-            <a:pPr algn="l" rtl="0"/>
-            <a:endParaRPr lang="en-US" sz="1400" dirty="0"/>
-          </a:p>
-          <a:p>
-            <a:pPr algn="l" rtl="0"/>
-            <a:r>
-              <a:rPr lang="en-US" sz="1400" dirty="0"/>
-              <a:t>        public delegate void </a:t>
-            </a:r>
-            <a:r>
-              <a:rPr lang="en-US" sz="1400" dirty="0" err="1"/>
-              <a:t>ProgressEventHandler</a:t>
-            </a:r>
-            <a:r>
-              <a:rPr lang="en-US" sz="1400" dirty="0"/>
-              <a:t>(Object sender, int percent);</a:t>
-            </a:r>
-          </a:p>
-          <a:p>
-            <a:pPr algn="l" rtl="0"/>
-            <a:r>
-              <a:rPr lang="en-US" sz="1400" dirty="0"/>
-              <a:t>        public event </a:t>
-            </a:r>
-            <a:r>
-              <a:rPr lang="en-US" sz="1400" dirty="0" err="1"/>
-              <a:t>ProgressEventHandler</a:t>
-            </a:r>
-            <a:r>
-              <a:rPr lang="en-US" sz="1400" dirty="0"/>
-              <a:t> </a:t>
-            </a:r>
-            <a:r>
-              <a:rPr lang="en-US" sz="1400" dirty="0" err="1"/>
-              <a:t>OnProgressUpdate</a:t>
-            </a:r>
-            <a:r>
-              <a:rPr lang="en-US" sz="1400" dirty="0"/>
-              <a:t>;</a:t>
-            </a:r>
-          </a:p>
-          <a:p>
-            <a:pPr algn="l" rtl="0"/>
-            <a:r>
-              <a:rPr lang="en-US" sz="1400" dirty="0"/>
-              <a:t>        </a:t>
-            </a:r>
-          </a:p>
-          <a:p>
-            <a:pPr algn="l" rtl="0"/>
-            <a:r>
-              <a:rPr lang="en-US" sz="1400" dirty="0"/>
-              <a:t>        public delegate void </a:t>
-            </a:r>
-            <a:r>
-              <a:rPr lang="en-US" sz="1400" dirty="0" err="1"/>
-              <a:t>TaskDoneEventHandler</a:t>
-            </a:r>
-            <a:r>
-              <a:rPr lang="en-US" sz="1400" dirty="0"/>
-              <a:t>(Object sender);</a:t>
-            </a:r>
-          </a:p>
-          <a:p>
-            <a:pPr algn="l" rtl="0"/>
-            <a:r>
-              <a:rPr lang="en-US" sz="1400" dirty="0"/>
-              <a:t>        public event </a:t>
-            </a:r>
-            <a:r>
-              <a:rPr lang="en-US" sz="1400" dirty="0" err="1"/>
-              <a:t>TaskDoneEventHandler</a:t>
-            </a:r>
-            <a:r>
-              <a:rPr lang="en-US" sz="1400" dirty="0"/>
-              <a:t> </a:t>
-            </a:r>
-            <a:r>
-              <a:rPr lang="en-US" sz="1400" dirty="0" err="1"/>
-              <a:t>OnFinish</a:t>
-            </a:r>
-            <a:r>
-              <a:rPr lang="en-US" sz="1400" dirty="0"/>
-              <a:t>;</a:t>
-            </a:r>
-          </a:p>
-          <a:p>
-            <a:pPr algn="l" rtl="0"/>
-            <a:r>
-              <a:rPr lang="en-US" sz="1400" dirty="0"/>
+              <a:rPr lang="en-IL" sz="1200" dirty="0">
+                <a:solidFill>
+                  <a:srgbClr val="000000"/>
+                </a:solidFill>
+                <a:latin typeface="Cascadia Mono" panose="020B0609020000020004" pitchFamily="49" charset="0"/>
+              </a:rPr>
               <a:t>    }</a:t>
             </a:r>
-            <a:endParaRPr lang="he-IL" sz="1400" dirty="0"/>
+            <a:endParaRPr lang="he-IL" sz="1050" dirty="0"/>
           </a:p>
         </p:txBody>
       </p:sp>

</xml_diff>